<commit_message>
komentáre k P10 P11
</commit_message>
<xml_diff>
--- a/Nove prednasky/P10_11.pptx
+++ b/Nove prednasky/P10_11.pptx
@@ -158,6 +158,204 @@
     </p:ext>
   </p:extLst>
 </p:presentation>
+</file>
+
+<file path=ppt/commentAuthors.xml><?xml version="1.0" encoding="utf-8"?>
+<p:cmAuthorLst xmlns:a="http://schemas.openxmlformats.org/drawingml/2006/main" xmlns:r="http://schemas.openxmlformats.org/officeDocument/2006/relationships" xmlns:p="http://schemas.openxmlformats.org/presentationml/2006/main">
+  <p:cmAuthor id="1" name="Používateľ systému Windows" initials="PsW" lastIdx="15" clrIdx="0">
+    <p:extLst>
+      <p:ext uri="{19B8F6BF-5375-455C-9EA6-DF929625EA0E}">
+        <p15:presenceInfo xmlns:p15="http://schemas.microsoft.com/office/powerpoint/2012/main" userId="Používateľ systému Windows" providerId="None"/>
+      </p:ext>
+    </p:extLst>
+  </p:cmAuthor>
+</p:cmAuthorLst>
+</file>
+
+<file path=ppt/comments/comment1.xml><?xml version="1.0" encoding="utf-8"?>
+<p:cmLst xmlns:a="http://schemas.openxmlformats.org/drawingml/2006/main" xmlns:r="http://schemas.openxmlformats.org/officeDocument/2006/relationships" xmlns:p="http://schemas.openxmlformats.org/presentationml/2006/main">
+  <p:cm authorId="1" dt="2019-06-03T21:39:22.787" idx="14">
+    <p:pos x="1967" y="1110"/>
+    <p:text>Odvážne tvrdenie.... treba definovať čo znamená ustáliť.. buď tam daj presnú definíciu alebo nič</p:text>
+    <p:extLst>
+      <p:ext uri="{C676402C-5697-4E1C-873F-D02D1690AC5C}">
+        <p15:threadingInfo xmlns:p15="http://schemas.microsoft.com/office/powerpoint/2012/main" timeZoneBias="-120"/>
+      </p:ext>
+    </p:extLst>
+  </p:cm>
+</p:cmLst>
+</file>
+
+<file path=ppt/comments/comment10.xml><?xml version="1.0" encoding="utf-8"?>
+<p:cmLst xmlns:a="http://schemas.openxmlformats.org/drawingml/2006/main" xmlns:r="http://schemas.openxmlformats.org/officeDocument/2006/relationships" xmlns:p="http://schemas.openxmlformats.org/presentationml/2006/main">
+  <p:cm authorId="1" dt="2019-06-03T21:25:36.778" idx="10">
+    <p:pos x="10" y="10"/>
+    <p:text>Bolo by dobré aj napísať čo ten priebeh zobrazuje, v zmysle : Priebeh regulácie korekčným členom na skokovú jednotkovú žiadanú hodnotu</p:text>
+    <p:extLst>
+      <p:ext uri="{C676402C-5697-4E1C-873F-D02D1690AC5C}">
+        <p15:threadingInfo xmlns:p15="http://schemas.microsoft.com/office/powerpoint/2012/main" timeZoneBias="-120"/>
+      </p:ext>
+    </p:extLst>
+  </p:cm>
+</p:cmLst>
+</file>
+
+<file path=ppt/comments/comment11.xml><?xml version="1.0" encoding="utf-8"?>
+<p:cmLst xmlns:a="http://schemas.openxmlformats.org/drawingml/2006/main" xmlns:r="http://schemas.openxmlformats.org/officeDocument/2006/relationships" xmlns:p="http://schemas.openxmlformats.org/presentationml/2006/main">
+  <p:cm authorId="1" dt="2019-06-03T21:28:08.368" idx="11">
+    <p:pos x="10" y="10"/>
+    <p:text>Opäť... čo je to .. ano porovnanie Lag Lead... ale aký bol vstup ? To platí pre všetky  podobné obrázky</p:text>
+    <p:extLst>
+      <p:ext uri="{C676402C-5697-4E1C-873F-D02D1690AC5C}">
+        <p15:threadingInfo xmlns:p15="http://schemas.microsoft.com/office/powerpoint/2012/main" timeZoneBias="-120"/>
+      </p:ext>
+    </p:extLst>
+  </p:cm>
+</p:cmLst>
+</file>
+
+<file path=ppt/comments/comment12.xml><?xml version="1.0" encoding="utf-8"?>
+<p:cmLst xmlns:a="http://schemas.openxmlformats.org/drawingml/2006/main" xmlns:r="http://schemas.openxmlformats.org/officeDocument/2006/relationships" xmlns:p="http://schemas.openxmlformats.org/presentationml/2006/main">
+  <p:cm authorId="1" dt="2019-06-03T21:32:12.200" idx="12">
+    <p:pos x="10" y="10"/>
+    <p:text>Je pravda, že na jednom lajde si to mal napísané, že jednotkový skok... ale stratilo sa mi to v kontexte... alebo som to prehliadol</p:text>
+    <p:extLst>
+      <p:ext uri="{C676402C-5697-4E1C-873F-D02D1690AC5C}">
+        <p15:threadingInfo xmlns:p15="http://schemas.microsoft.com/office/powerpoint/2012/main" timeZoneBias="-120"/>
+      </p:ext>
+    </p:extLst>
+  </p:cm>
+</p:cmLst>
+</file>
+
+<file path=ppt/comments/comment2.xml><?xml version="1.0" encoding="utf-8"?>
+<p:cmLst xmlns:a="http://schemas.openxmlformats.org/drawingml/2006/main" xmlns:r="http://schemas.openxmlformats.org/officeDocument/2006/relationships" xmlns:p="http://schemas.openxmlformats.org/presentationml/2006/main">
+  <p:cm authorId="1" dt="2019-06-03T20:58:45.941" idx="1">
+    <p:pos x="3773" y="680"/>
+    <p:text>Zmeny čoho ? Treba špecifikovať prečo je spätná väzba výhodnejšia oproti doprednému riadeniu... keď tak</p:text>
+    <p:extLst>
+      <p:ext uri="{C676402C-5697-4E1C-873F-D02D1690AC5C}">
+        <p15:threadingInfo xmlns:p15="http://schemas.microsoft.com/office/powerpoint/2012/main" timeZoneBias="-120"/>
+      </p:ext>
+    </p:extLst>
+  </p:cm>
+  <p:cm authorId="1" dt="2019-06-03T21:10:09.288" idx="4">
+    <p:pos x="711" y="1152"/>
+    <p:text>W nie je vstup .... je to síce vstup do URO  ... ale je to žiadanej hodnoty</p:text>
+    <p:extLst>
+      <p:ext uri="{C676402C-5697-4E1C-873F-D02D1690AC5C}">
+        <p15:threadingInfo xmlns:p15="http://schemas.microsoft.com/office/powerpoint/2012/main" timeZoneBias="-120"/>
+      </p:ext>
+    </p:extLst>
+  </p:cm>
+</p:cmLst>
+</file>
+
+<file path=ppt/comments/comment3.xml><?xml version="1.0" encoding="utf-8"?>
+<p:cmLst xmlns:a="http://schemas.openxmlformats.org/drawingml/2006/main" xmlns:r="http://schemas.openxmlformats.org/officeDocument/2006/relationships" xmlns:p="http://schemas.openxmlformats.org/presentationml/2006/main">
+  <p:cm authorId="1" dt="2019-06-03T21:07:18.037" idx="3">
+    <p:pos x="2724" y="2724"/>
+    <p:text>Prenos čoho to bude ? URO ? Čo je Go ... Označuj signály a prenosovky tak ako je v blokovej schéme ... Prečo sú (o) a (K) v zátvorkách ... to nie sú premenné</p:text>
+    <p:extLst>
+      <p:ext uri="{C676402C-5697-4E1C-873F-D02D1690AC5C}">
+        <p15:threadingInfo xmlns:p15="http://schemas.microsoft.com/office/powerpoint/2012/main" timeZoneBias="-120"/>
+      </p:ext>
+    </p:extLst>
+  </p:cm>
+</p:cmLst>
+</file>
+
+<file path=ppt/comments/comment4.xml><?xml version="1.0" encoding="utf-8"?>
+<p:cmLst xmlns:a="http://schemas.openxmlformats.org/drawingml/2006/main" xmlns:r="http://schemas.openxmlformats.org/officeDocument/2006/relationships" xmlns:p="http://schemas.openxmlformats.org/presentationml/2006/main">
+  <p:cm authorId="1" dt="2019-06-03T21:12:05.698" idx="5">
+    <p:pos x="1928" y="2028"/>
+    <p:text>Toto je drsný slang jak sviňa .... ja viem že to v tej pôvodnej prenáške bolo ... ale treba to prepísať do tvaru kde bude pri bčkach imaginárna jednotka (a+bj)(a-bj) - a napíš že sa jedná o vzťah pre násobenie komplexného čísla komplexne združeným číslom</p:text>
+    <p:extLst>
+      <p:ext uri="{C676402C-5697-4E1C-873F-D02D1690AC5C}">
+        <p15:threadingInfo xmlns:p15="http://schemas.microsoft.com/office/powerpoint/2012/main" timeZoneBias="-120"/>
+      </p:ext>
+    </p:extLst>
+  </p:cm>
+  <p:cm authorId="1" dt="2019-06-03T21:14:28.895" idx="6">
+    <p:pos x="5257" y="2864"/>
+    <p:text>inflexný bod nie je zmana znamienka - keď tak zmena znamienka druhej derivácie</p:text>
+    <p:extLst>
+      <p:ext uri="{C676402C-5697-4E1C-873F-D02D1690AC5C}">
+        <p15:threadingInfo xmlns:p15="http://schemas.microsoft.com/office/powerpoint/2012/main" timeZoneBias="-120"/>
+      </p:ext>
+    </p:extLst>
+  </p:cm>
+</p:cmLst>
+</file>
+
+<file path=ppt/comments/comment5.xml><?xml version="1.0" encoding="utf-8"?>
+<p:cmLst xmlns:a="http://schemas.openxmlformats.org/drawingml/2006/main" xmlns:r="http://schemas.openxmlformats.org/officeDocument/2006/relationships" xmlns:p="http://schemas.openxmlformats.org/presentationml/2006/main">
+  <p:cm authorId="1" dt="2019-06-03T21:41:33.912" idx="15">
+    <p:pos x="10" y="10"/>
+    <p:text>Velmi zle čiteteľné ... ale stále lepšie ako originál</p:text>
+    <p:extLst>
+      <p:ext uri="{C676402C-5697-4E1C-873F-D02D1690AC5C}">
+        <p15:threadingInfo xmlns:p15="http://schemas.microsoft.com/office/powerpoint/2012/main" timeZoneBias="-120"/>
+      </p:ext>
+    </p:extLst>
+  </p:cm>
+</p:cmLst>
+</file>
+
+<file path=ppt/comments/comment6.xml><?xml version="1.0" encoding="utf-8"?>
+<p:cmLst xmlns:a="http://schemas.openxmlformats.org/drawingml/2006/main" xmlns:r="http://schemas.openxmlformats.org/officeDocument/2006/relationships" xmlns:p="http://schemas.openxmlformats.org/presentationml/2006/main">
+  <p:cm authorId="1" dt="2019-06-03T21:19:48.994" idx="7">
+    <p:pos x="5532" y="1152"/>
+    <p:text>Rovnaké formátovanie pre všetky riadky - väčšie riadkovanie</p:text>
+    <p:extLst>
+      <p:ext uri="{C676402C-5697-4E1C-873F-D02D1690AC5C}">
+        <p15:threadingInfo xmlns:p15="http://schemas.microsoft.com/office/powerpoint/2012/main" timeZoneBias="-120"/>
+      </p:ext>
+    </p:extLst>
+  </p:cm>
+</p:cmLst>
+</file>
+
+<file path=ppt/comments/comment7.xml><?xml version="1.0" encoding="utf-8"?>
+<p:cmLst xmlns:a="http://schemas.openxmlformats.org/drawingml/2006/main" xmlns:r="http://schemas.openxmlformats.org/officeDocument/2006/relationships" xmlns:p="http://schemas.openxmlformats.org/presentationml/2006/main">
+  <p:cm authorId="1" dt="2019-06-03T21:33:21.568" idx="13">
+    <p:pos x="10" y="10"/>
+    <p:text>Exportuj tie obrazky v niej mierke -  mešie okno grafu - potom bude text váčší a čiary hrubšie  - tak ako to je na slajde 28. Takto je to nečitateľné</p:text>
+    <p:extLst>
+      <p:ext uri="{C676402C-5697-4E1C-873F-D02D1690AC5C}">
+        <p15:threadingInfo xmlns:p15="http://schemas.microsoft.com/office/powerpoint/2012/main" timeZoneBias="-120"/>
+      </p:ext>
+    </p:extLst>
+  </p:cm>
+</p:cmLst>
+</file>
+
+<file path=ppt/comments/comment8.xml><?xml version="1.0" encoding="utf-8"?>
+<p:cmLst xmlns:a="http://schemas.openxmlformats.org/drawingml/2006/main" xmlns:r="http://schemas.openxmlformats.org/officeDocument/2006/relationships" xmlns:p="http://schemas.openxmlformats.org/presentationml/2006/main">
+  <p:cm authorId="1" dt="2019-06-03T21:21:34.520" idx="8">
+    <p:pos x="4105" y="26"/>
+    <p:text>zaostávaním</p:text>
+    <p:extLst>
+      <p:ext uri="{C676402C-5697-4E1C-873F-D02D1690AC5C}">
+        <p15:threadingInfo xmlns:p15="http://schemas.microsoft.com/office/powerpoint/2012/main" timeZoneBias="-120"/>
+      </p:ext>
+    </p:extLst>
+  </p:cm>
+</p:cmLst>
+</file>
+
+<file path=ppt/comments/comment9.xml><?xml version="1.0" encoding="utf-8"?>
+<p:cmLst xmlns:a="http://schemas.openxmlformats.org/drawingml/2006/main" xmlns:r="http://schemas.openxmlformats.org/officeDocument/2006/relationships" xmlns:p="http://schemas.openxmlformats.org/presentationml/2006/main">
+  <p:cm authorId="1" dt="2019-06-03T21:22:29.428" idx="9">
+    <p:pos x="5319" y="680"/>
+    <p:text>velmi zlá čiteteľnosť.... väčšie riadkovanie a rovnaké formátovenie textu.... akože to farebné zvýraznenie je ok... to môže ostať</p:text>
+    <p:extLst>
+      <p:ext uri="{C676402C-5697-4E1C-873F-D02D1690AC5C}">
+        <p15:threadingInfo xmlns:p15="http://schemas.microsoft.com/office/powerpoint/2012/main" timeZoneBias="-120"/>
+      </p:ext>
+    </p:extLst>
+  </p:cm>
+</p:cmLst>
 </file>
 
 <file path=ppt/slideLayouts/slideLayout1.xml><?xml version="1.0" encoding="utf-8"?>
@@ -446,7 +644,7 @@
           <a:p>
             <a:fld id="{B1F4BD78-2EC2-485B-A16B-A2D870866C74}" type="datetimeFigureOut">
               <a:rPr lang="sk-SK" smtClean="0"/>
-              <a:t>2. 6. 2019</a:t>
+              <a:t>3. 6. 2019</a:t>
             </a:fld>
             <a:endParaRPr lang="sk-SK"/>
           </a:p>
@@ -537,7 +735,7 @@
           <p:cNvPr id="11" name="Obrázok 10">
             <a:extLst>
               <a:ext uri="{FF2B5EF4-FFF2-40B4-BE49-F238E27FC236}">
-                <a16:creationId xmlns:a16="http://schemas.microsoft.com/office/drawing/2014/main" id="{D575F8E8-6CC8-49FD-8010-88908C002CDA}"/>
+                <a16:creationId xmlns:a16="http://schemas.microsoft.com/office/drawing/2014/main" xmlns="" id="{D575F8E8-6CC8-49FD-8010-88908C002CDA}"/>
               </a:ext>
             </a:extLst>
           </p:cNvPr>
@@ -573,7 +771,7 @@
           <p:cNvPr id="13" name="Obrázok 12">
             <a:extLst>
               <a:ext uri="{FF2B5EF4-FFF2-40B4-BE49-F238E27FC236}">
-                <a16:creationId xmlns:a16="http://schemas.microsoft.com/office/drawing/2014/main" id="{E0A78DBF-D0B2-42A5-9F1D-0CAC637C7D2D}"/>
+                <a16:creationId xmlns:a16="http://schemas.microsoft.com/office/drawing/2014/main" xmlns="" id="{E0A78DBF-D0B2-42A5-9F1D-0CAC637C7D2D}"/>
               </a:ext>
             </a:extLst>
           </p:cNvPr>
@@ -730,7 +928,7 @@
           <a:p>
             <a:fld id="{B1F4BD78-2EC2-485B-A16B-A2D870866C74}" type="datetimeFigureOut">
               <a:rPr lang="sk-SK" smtClean="0"/>
-              <a:t>2. 6. 2019</a:t>
+              <a:t>3. 6. 2019</a:t>
             </a:fld>
             <a:endParaRPr lang="sk-SK"/>
           </a:p>
@@ -1073,7 +1271,7 @@
           <a:p>
             <a:fld id="{B1F4BD78-2EC2-485B-A16B-A2D870866C74}" type="datetimeFigureOut">
               <a:rPr lang="sk-SK" smtClean="0"/>
-              <a:t>2. 6. 2019</a:t>
+              <a:t>3. 6. 2019</a:t>
             </a:fld>
             <a:endParaRPr lang="sk-SK"/>
           </a:p>
@@ -1348,7 +1546,7 @@
           <a:p>
             <a:fld id="{B1F4BD78-2EC2-485B-A16B-A2D870866C74}" type="datetimeFigureOut">
               <a:rPr lang="sk-SK" smtClean="0"/>
-              <a:t>2. 6. 2019</a:t>
+              <a:t>3. 6. 2019</a:t>
             </a:fld>
             <a:endParaRPr lang="sk-SK"/>
           </a:p>
@@ -1727,7 +1925,7 @@
           <a:p>
             <a:fld id="{B1F4BD78-2EC2-485B-A16B-A2D870866C74}" type="datetimeFigureOut">
               <a:rPr lang="sk-SK" smtClean="0"/>
-              <a:t>2. 6. 2019</a:t>
+              <a:t>3. 6. 2019</a:t>
             </a:fld>
             <a:endParaRPr lang="sk-SK"/>
           </a:p>
@@ -1845,7 +2043,7 @@
           <a:p>
             <a:fld id="{B1F4BD78-2EC2-485B-A16B-A2D870866C74}" type="datetimeFigureOut">
               <a:rPr lang="sk-SK" smtClean="0"/>
-              <a:t>2. 6. 2019</a:t>
+              <a:t>3. 6. 2019</a:t>
             </a:fld>
             <a:endParaRPr lang="sk-SK"/>
           </a:p>
@@ -2016,7 +2214,7 @@
           <a:p>
             <a:fld id="{B1F4BD78-2EC2-485B-A16B-A2D870866C74}" type="datetimeFigureOut">
               <a:rPr lang="sk-SK" smtClean="0"/>
-              <a:t>2. 6. 2019</a:t>
+              <a:t>3. 6. 2019</a:t>
             </a:fld>
             <a:endParaRPr lang="sk-SK"/>
           </a:p>
@@ -2370,7 +2568,7 @@
           <a:p>
             <a:fld id="{B1F4BD78-2EC2-485B-A16B-A2D870866C74}" type="datetimeFigureOut">
               <a:rPr lang="sk-SK" smtClean="0"/>
-              <a:t>2. 6. 2019</a:t>
+              <a:t>3. 6. 2019</a:t>
             </a:fld>
             <a:endParaRPr lang="sk-SK"/>
           </a:p>
@@ -2752,7 +2950,7 @@
           <a:p>
             <a:fld id="{B1F4BD78-2EC2-485B-A16B-A2D870866C74}" type="datetimeFigureOut">
               <a:rPr lang="sk-SK" smtClean="0"/>
-              <a:t>2. 6. 2019</a:t>
+              <a:t>3. 6. 2019</a:t>
             </a:fld>
             <a:endParaRPr lang="sk-SK"/>
           </a:p>
@@ -3047,7 +3245,7 @@
           <a:p>
             <a:fld id="{B1F4BD78-2EC2-485B-A16B-A2D870866C74}" type="datetimeFigureOut">
               <a:rPr lang="sk-SK" smtClean="0"/>
-              <a:t>2. 6. 2019</a:t>
+              <a:t>3. 6. 2019</a:t>
             </a:fld>
             <a:endParaRPr lang="sk-SK"/>
           </a:p>
@@ -3533,7 +3731,7 @@
           <p:cNvPr id="2" name="Nadpis 1">
             <a:extLst>
               <a:ext uri="{FF2B5EF4-FFF2-40B4-BE49-F238E27FC236}">
-                <a16:creationId xmlns:a16="http://schemas.microsoft.com/office/drawing/2014/main" id="{8C9FEECD-5BD9-4CA4-ACC1-DA9C1EDD96B6}"/>
+                <a16:creationId xmlns:a16="http://schemas.microsoft.com/office/drawing/2014/main" xmlns="" id="{8C9FEECD-5BD9-4CA4-ACC1-DA9C1EDD96B6}"/>
               </a:ext>
             </a:extLst>
           </p:cNvPr>
@@ -3568,7 +3766,7 @@
           <p:cNvPr id="3" name="Podnadpis 2">
             <a:extLst>
               <a:ext uri="{FF2B5EF4-FFF2-40B4-BE49-F238E27FC236}">
-                <a16:creationId xmlns:a16="http://schemas.microsoft.com/office/drawing/2014/main" id="{313B57F5-B394-40F1-BEAB-F5B71B2FEDE1}"/>
+                <a16:creationId xmlns:a16="http://schemas.microsoft.com/office/drawing/2014/main" xmlns="" id="{313B57F5-B394-40F1-BEAB-F5B71B2FEDE1}"/>
               </a:ext>
             </a:extLst>
           </p:cNvPr>
@@ -3591,8 +3789,23 @@
           <a:p>
             <a:r>
               <a:rPr lang="sk-SK" dirty="0"/>
-              <a:t>Úvod do Kybernetiky</a:t>
+              <a:t>Úvod </a:t>
             </a:r>
+            <a:r>
+              <a:rPr lang="sk-SK" dirty="0" smtClean="0"/>
+              <a:t>do Kybernetiky</a:t>
+            </a:r>
+          </a:p>
+          <a:p>
+            <a:r>
+              <a:rPr lang="sk-SK" cap="none" dirty="0"/>
+              <a:t>prof. Ing. Ján Murgaš, PhD</a:t>
+            </a:r>
+            <a:r>
+              <a:rPr lang="sk-SK" cap="none" dirty="0" smtClean="0"/>
+              <a:t>.</a:t>
+            </a:r>
+            <a:endParaRPr lang="sk-SK" cap="none" dirty="0"/>
           </a:p>
         </p:txBody>
       </p:sp>
@@ -3631,7 +3844,7 @@
           <p:cNvPr id="2" name="Nadpis 1">
             <a:extLst>
               <a:ext uri="{FF2B5EF4-FFF2-40B4-BE49-F238E27FC236}">
-                <a16:creationId xmlns:a16="http://schemas.microsoft.com/office/drawing/2014/main" id="{13EE0454-4DA7-4198-A2F1-CD2E28322660}"/>
+                <a16:creationId xmlns:a16="http://schemas.microsoft.com/office/drawing/2014/main" xmlns="" id="{13EE0454-4DA7-4198-A2F1-CD2E28322660}"/>
               </a:ext>
             </a:extLst>
           </p:cNvPr>
@@ -3661,7 +3874,7 @@
               <p:cNvPr id="3" name="Zástupný objekt pre obsah 2">
                 <a:extLst>
                   <a:ext uri="{FF2B5EF4-FFF2-40B4-BE49-F238E27FC236}">
-                    <a16:creationId xmlns:a16="http://schemas.microsoft.com/office/drawing/2014/main" id="{D6AA175F-8A19-4571-9744-D8652A899CBE}"/>
+                    <a16:creationId xmlns:a16="http://schemas.microsoft.com/office/drawing/2014/main" xmlns="" id="{D6AA175F-8A19-4571-9744-D8652A899CBE}"/>
                   </a:ext>
                 </a:extLst>
               </p:cNvPr>
@@ -3787,7 +4000,7 @@
               <p:cNvPr id="4" name="Obdĺžnik 3">
                 <a:extLst>
                   <a:ext uri="{FF2B5EF4-FFF2-40B4-BE49-F238E27FC236}">
-                    <a16:creationId xmlns:a16="http://schemas.microsoft.com/office/drawing/2014/main" id="{0932342D-FD16-47C8-9709-FBE58569A9EE}"/>
+                    <a16:creationId xmlns:a16="http://schemas.microsoft.com/office/drawing/2014/main" xmlns="" id="{0932342D-FD16-47C8-9709-FBE58569A9EE}"/>
                   </a:ext>
                 </a:extLst>
               </p:cNvPr>
@@ -3971,7 +4184,7 @@
           <p:cNvPr id="6" name="Obrázok 5">
             <a:extLst>
               <a:ext uri="{FF2B5EF4-FFF2-40B4-BE49-F238E27FC236}">
-                <a16:creationId xmlns:a16="http://schemas.microsoft.com/office/drawing/2014/main" id="{993D9822-6559-4027-B245-0D03D59259EB}"/>
+                <a16:creationId xmlns:a16="http://schemas.microsoft.com/office/drawing/2014/main" xmlns="" id="{993D9822-6559-4027-B245-0D03D59259EB}"/>
               </a:ext>
             </a:extLst>
           </p:cNvPr>
@@ -4003,7 +4216,7 @@
               <p:cNvPr id="7" name="Obdĺžnik 6">
                 <a:extLst>
                   <a:ext uri="{FF2B5EF4-FFF2-40B4-BE49-F238E27FC236}">
-                    <a16:creationId xmlns:a16="http://schemas.microsoft.com/office/drawing/2014/main" id="{36BF9E18-347A-4724-990D-3504337883C6}"/>
+                    <a16:creationId xmlns:a16="http://schemas.microsoft.com/office/drawing/2014/main" xmlns="" id="{36BF9E18-347A-4724-990D-3504337883C6}"/>
                   </a:ext>
                 </a:extLst>
               </p:cNvPr>
@@ -4216,7 +4429,7 @@
           <p:cNvPr id="8" name="Obdĺžnik 7">
             <a:extLst>
               <a:ext uri="{FF2B5EF4-FFF2-40B4-BE49-F238E27FC236}">
-                <a16:creationId xmlns:a16="http://schemas.microsoft.com/office/drawing/2014/main" id="{891C14A6-8896-44E5-83B4-4C224B610524}"/>
+                <a16:creationId xmlns:a16="http://schemas.microsoft.com/office/drawing/2014/main" xmlns="" id="{891C14A6-8896-44E5-83B4-4C224B610524}"/>
               </a:ext>
             </a:extLst>
           </p:cNvPr>
@@ -4551,7 +4764,7 @@
           <p:cNvPr id="2" name="Nadpis 1">
             <a:extLst>
               <a:ext uri="{FF2B5EF4-FFF2-40B4-BE49-F238E27FC236}">
-                <a16:creationId xmlns:a16="http://schemas.microsoft.com/office/drawing/2014/main" id="{25417622-9ECF-49D0-A18E-9530D3DB2F36}"/>
+                <a16:creationId xmlns:a16="http://schemas.microsoft.com/office/drawing/2014/main" xmlns="" id="{25417622-9ECF-49D0-A18E-9530D3DB2F36}"/>
               </a:ext>
             </a:extLst>
           </p:cNvPr>
@@ -4600,7 +4813,7 @@
               <p:cNvPr id="3" name="Zástupný objekt pre obsah 2">
                 <a:extLst>
                   <a:ext uri="{FF2B5EF4-FFF2-40B4-BE49-F238E27FC236}">
-                    <a16:creationId xmlns:a16="http://schemas.microsoft.com/office/drawing/2014/main" id="{5E8E194F-D507-42AC-9236-EE92790A23CD}"/>
+                    <a16:creationId xmlns:a16="http://schemas.microsoft.com/office/drawing/2014/main" xmlns="" id="{5E8E194F-D507-42AC-9236-EE92790A23CD}"/>
                   </a:ext>
                 </a:extLst>
               </p:cNvPr>
@@ -6161,7 +6374,7 @@
               <p:cNvPr id="4" name="Obdĺžnik 3">
                 <a:extLst>
                   <a:ext uri="{FF2B5EF4-FFF2-40B4-BE49-F238E27FC236}">
-                    <a16:creationId xmlns:a16="http://schemas.microsoft.com/office/drawing/2014/main" id="{12E654AA-1AA0-4370-945C-DF12CD19FD8F}"/>
+                    <a16:creationId xmlns:a16="http://schemas.microsoft.com/office/drawing/2014/main" xmlns="" id="{12E654AA-1AA0-4370-945C-DF12CD19FD8F}"/>
                   </a:ext>
                 </a:extLst>
               </p:cNvPr>
@@ -6763,7 +6976,7 @@
           <p:cNvPr id="2" name="Nadpis 1">
             <a:extLst>
               <a:ext uri="{FF2B5EF4-FFF2-40B4-BE49-F238E27FC236}">
-                <a16:creationId xmlns:a16="http://schemas.microsoft.com/office/drawing/2014/main" id="{2012E70C-BBBA-4ED8-9372-F4DCC606DC92}"/>
+                <a16:creationId xmlns:a16="http://schemas.microsoft.com/office/drawing/2014/main" xmlns="" id="{2012E70C-BBBA-4ED8-9372-F4DCC606DC92}"/>
               </a:ext>
             </a:extLst>
           </p:cNvPr>
@@ -6793,7 +7006,7 @@
               <p:cNvPr id="3" name="Zástupný objekt pre obsah 2">
                 <a:extLst>
                   <a:ext uri="{FF2B5EF4-FFF2-40B4-BE49-F238E27FC236}">
-                    <a16:creationId xmlns:a16="http://schemas.microsoft.com/office/drawing/2014/main" id="{BFD5F2F7-C7F3-4890-A4A8-AB3463806122}"/>
+                    <a16:creationId xmlns:a16="http://schemas.microsoft.com/office/drawing/2014/main" xmlns="" id="{BFD5F2F7-C7F3-4890-A4A8-AB3463806122}"/>
                   </a:ext>
                 </a:extLst>
               </p:cNvPr>
@@ -8911,7 +9124,7 @@
           <p:cNvPr id="4" name="Object 67">
             <a:extLst>
               <a:ext uri="{FF2B5EF4-FFF2-40B4-BE49-F238E27FC236}">
-                <a16:creationId xmlns:a16="http://schemas.microsoft.com/office/drawing/2014/main" id="{4151B9F0-B6EB-4616-8387-7F2E37811C77}"/>
+                <a16:creationId xmlns:a16="http://schemas.microsoft.com/office/drawing/2014/main" xmlns="" id="{4151B9F0-B6EB-4616-8387-7F2E37811C77}"/>
               </a:ext>
             </a:extLst>
           </p:cNvPr>
@@ -8934,7 +9147,7 @@
           <a:graphicData uri="http://schemas.openxmlformats.org/presentationml/2006/ole">
             <mc:AlternateContent xmlns:mc="http://schemas.openxmlformats.org/markup-compatibility/2006">
               <mc:Choice xmlns:v="urn:schemas-microsoft-com:vml" Requires="v">
-                <p:oleObj spid="_x0000_s6178" name="Document" r:id="rId4" imgW="5650865" imgH="1318260" progId="Word.Document.8">
+                <p:oleObj spid="_x0000_s6181" name="Document" r:id="rId4" imgW="5650865" imgH="1318260" progId="Word.Document.8">
                   <p:embed/>
                 </p:oleObj>
               </mc:Choice>
@@ -9019,7 +9232,7 @@
           <p:cNvPr id="2" name="Nadpis 1">
             <a:extLst>
               <a:ext uri="{FF2B5EF4-FFF2-40B4-BE49-F238E27FC236}">
-                <a16:creationId xmlns:a16="http://schemas.microsoft.com/office/drawing/2014/main" id="{1EC09031-46F5-44A4-8F7A-25DB1D02AC19}"/>
+                <a16:creationId xmlns:a16="http://schemas.microsoft.com/office/drawing/2014/main" xmlns="" id="{1EC09031-46F5-44A4-8F7A-25DB1D02AC19}"/>
               </a:ext>
             </a:extLst>
           </p:cNvPr>
@@ -9049,7 +9262,7 @@
               <p:cNvPr id="3" name="Zástupný objekt pre obsah 2">
                 <a:extLst>
                   <a:ext uri="{FF2B5EF4-FFF2-40B4-BE49-F238E27FC236}">
-                    <a16:creationId xmlns:a16="http://schemas.microsoft.com/office/drawing/2014/main" id="{1D6B1895-BEFE-4F39-8ECC-40D6E77C5962}"/>
+                    <a16:creationId xmlns:a16="http://schemas.microsoft.com/office/drawing/2014/main" xmlns="" id="{1D6B1895-BEFE-4F39-8ECC-40D6E77C5962}"/>
                   </a:ext>
                 </a:extLst>
               </p:cNvPr>
@@ -10944,7 +11157,7 @@
               <p:cNvPr id="4" name="Obdĺžnik 3">
                 <a:extLst>
                   <a:ext uri="{FF2B5EF4-FFF2-40B4-BE49-F238E27FC236}">
-                    <a16:creationId xmlns:a16="http://schemas.microsoft.com/office/drawing/2014/main" id="{D83D1333-E180-4255-B76E-B6D298E1069B}"/>
+                    <a16:creationId xmlns:a16="http://schemas.microsoft.com/office/drawing/2014/main" xmlns="" id="{D83D1333-E180-4255-B76E-B6D298E1069B}"/>
                   </a:ext>
                 </a:extLst>
               </p:cNvPr>
@@ -11895,7 +12108,7 @@
           <p:cNvPr id="2" name="Nadpis 1">
             <a:extLst>
               <a:ext uri="{FF2B5EF4-FFF2-40B4-BE49-F238E27FC236}">
-                <a16:creationId xmlns:a16="http://schemas.microsoft.com/office/drawing/2014/main" id="{46760AC4-1926-4878-B843-873598CD2A06}"/>
+                <a16:creationId xmlns:a16="http://schemas.microsoft.com/office/drawing/2014/main" xmlns="" id="{46760AC4-1926-4878-B843-873598CD2A06}"/>
               </a:ext>
             </a:extLst>
           </p:cNvPr>
@@ -11923,7 +12136,7 @@
           <p:cNvPr id="3" name="Zástupný objekt pre obsah 2">
             <a:extLst>
               <a:ext uri="{FF2B5EF4-FFF2-40B4-BE49-F238E27FC236}">
-                <a16:creationId xmlns:a16="http://schemas.microsoft.com/office/drawing/2014/main" id="{BC3732D6-2B01-4D51-9CC3-F0DC932C3A62}"/>
+                <a16:creationId xmlns:a16="http://schemas.microsoft.com/office/drawing/2014/main" xmlns="" id="{BC3732D6-2B01-4D51-9CC3-F0DC932C3A62}"/>
               </a:ext>
             </a:extLst>
           </p:cNvPr>
@@ -11948,7 +12161,7 @@
           <p:cNvPr id="7" name="Obrázok 6">
             <a:extLst>
               <a:ext uri="{FF2B5EF4-FFF2-40B4-BE49-F238E27FC236}">
-                <a16:creationId xmlns:a16="http://schemas.microsoft.com/office/drawing/2014/main" id="{649FD3E5-D207-4654-897E-33C295256E70}"/>
+                <a16:creationId xmlns:a16="http://schemas.microsoft.com/office/drawing/2014/main" xmlns="" id="{649FD3E5-D207-4654-897E-33C295256E70}"/>
               </a:ext>
             </a:extLst>
           </p:cNvPr>
@@ -12008,7 +12221,7 @@
           <p:cNvPr id="2" name="Nadpis 1">
             <a:extLst>
               <a:ext uri="{FF2B5EF4-FFF2-40B4-BE49-F238E27FC236}">
-                <a16:creationId xmlns:a16="http://schemas.microsoft.com/office/drawing/2014/main" id="{5C422C2D-4C1B-4973-8A5C-94431E841ACC}"/>
+                <a16:creationId xmlns:a16="http://schemas.microsoft.com/office/drawing/2014/main" xmlns="" id="{5C422C2D-4C1B-4973-8A5C-94431E841ACC}"/>
               </a:ext>
             </a:extLst>
           </p:cNvPr>
@@ -12036,7 +12249,7 @@
           <p:cNvPr id="6" name="Zástupný objekt pre obsah 5">
             <a:extLst>
               <a:ext uri="{FF2B5EF4-FFF2-40B4-BE49-F238E27FC236}">
-                <a16:creationId xmlns:a16="http://schemas.microsoft.com/office/drawing/2014/main" id="{17494EFF-EB2D-4DB3-8D3F-061EE7961FFC}"/>
+                <a16:creationId xmlns:a16="http://schemas.microsoft.com/office/drawing/2014/main" xmlns="" id="{17494EFF-EB2D-4DB3-8D3F-061EE7961FFC}"/>
               </a:ext>
             </a:extLst>
           </p:cNvPr>
@@ -12061,7 +12274,7 @@
           <p:cNvPr id="7" name="Obrázok 6">
             <a:extLst>
               <a:ext uri="{FF2B5EF4-FFF2-40B4-BE49-F238E27FC236}">
-                <a16:creationId xmlns:a16="http://schemas.microsoft.com/office/drawing/2014/main" id="{ABDDBD95-9250-40D5-923B-6E3A1EE74A10}"/>
+                <a16:creationId xmlns:a16="http://schemas.microsoft.com/office/drawing/2014/main" xmlns="" id="{ABDDBD95-9250-40D5-923B-6E3A1EE74A10}"/>
               </a:ext>
             </a:extLst>
           </p:cNvPr>
@@ -12078,7 +12291,7 @@
         </p:blipFill>
         <p:spPr>
           <a:xfrm>
-            <a:off x="0" y="1130228"/>
+            <a:off x="131806" y="1040446"/>
             <a:ext cx="9144000" cy="5727771"/>
           </a:xfrm>
           <a:prstGeom prst="rect">
@@ -12121,7 +12334,7 @@
           <p:cNvPr id="2" name="Nadpis 1">
             <a:extLst>
               <a:ext uri="{FF2B5EF4-FFF2-40B4-BE49-F238E27FC236}">
-                <a16:creationId xmlns:a16="http://schemas.microsoft.com/office/drawing/2014/main" id="{E9DA5734-8D89-460C-9C63-92E95E5BE054}"/>
+                <a16:creationId xmlns:a16="http://schemas.microsoft.com/office/drawing/2014/main" xmlns="" id="{E9DA5734-8D89-460C-9C63-92E95E5BE054}"/>
               </a:ext>
             </a:extLst>
           </p:cNvPr>
@@ -12156,7 +12369,7 @@
           <p:cNvPr id="3" name="Zástupný objekt pre obsah 2">
             <a:extLst>
               <a:ext uri="{FF2B5EF4-FFF2-40B4-BE49-F238E27FC236}">
-                <a16:creationId xmlns:a16="http://schemas.microsoft.com/office/drawing/2014/main" id="{E28D6B51-11C2-4745-BFA5-56FD2CFE3940}"/>
+                <a16:creationId xmlns:a16="http://schemas.microsoft.com/office/drawing/2014/main" xmlns="" id="{E28D6B51-11C2-4745-BFA5-56FD2CFE3940}"/>
               </a:ext>
             </a:extLst>
           </p:cNvPr>
@@ -12208,7 +12421,7 @@
           <p:cNvPr id="4" name="Obrázok 3">
             <a:extLst>
               <a:ext uri="{FF2B5EF4-FFF2-40B4-BE49-F238E27FC236}">
-                <a16:creationId xmlns:a16="http://schemas.microsoft.com/office/drawing/2014/main" id="{34258AE5-B7BD-41D7-9B5F-C59220830CED}"/>
+                <a16:creationId xmlns:a16="http://schemas.microsoft.com/office/drawing/2014/main" xmlns="" id="{34258AE5-B7BD-41D7-9B5F-C59220830CED}"/>
               </a:ext>
             </a:extLst>
           </p:cNvPr>
@@ -12268,7 +12481,7 @@
           <p:cNvPr id="2" name="Nadpis 1">
             <a:extLst>
               <a:ext uri="{FF2B5EF4-FFF2-40B4-BE49-F238E27FC236}">
-                <a16:creationId xmlns:a16="http://schemas.microsoft.com/office/drawing/2014/main" id="{A8D95754-7B46-4FB1-8CC3-0AACD4BA7E9F}"/>
+                <a16:creationId xmlns:a16="http://schemas.microsoft.com/office/drawing/2014/main" xmlns="" id="{A8D95754-7B46-4FB1-8CC3-0AACD4BA7E9F}"/>
               </a:ext>
             </a:extLst>
           </p:cNvPr>
@@ -12300,7 +12513,7 @@
           <p:cNvPr id="3" name="Zástupný objekt pre obsah 2">
             <a:extLst>
               <a:ext uri="{FF2B5EF4-FFF2-40B4-BE49-F238E27FC236}">
-                <a16:creationId xmlns:a16="http://schemas.microsoft.com/office/drawing/2014/main" id="{8E23EFDD-9FBF-46FA-BC29-6B37ADFE1D99}"/>
+                <a16:creationId xmlns:a16="http://schemas.microsoft.com/office/drawing/2014/main" xmlns="" id="{8E23EFDD-9FBF-46FA-BC29-6B37ADFE1D99}"/>
               </a:ext>
             </a:extLst>
           </p:cNvPr>
@@ -12377,7 +12590,7 @@
           <p:cNvPr id="4" name="Obrázok 3">
             <a:extLst>
               <a:ext uri="{FF2B5EF4-FFF2-40B4-BE49-F238E27FC236}">
-                <a16:creationId xmlns:a16="http://schemas.microsoft.com/office/drawing/2014/main" id="{8E919793-D2E3-4756-A7CA-BA2DA3D7FDE3}"/>
+                <a16:creationId xmlns:a16="http://schemas.microsoft.com/office/drawing/2014/main" xmlns="" id="{8E919793-D2E3-4756-A7CA-BA2DA3D7FDE3}"/>
               </a:ext>
             </a:extLst>
           </p:cNvPr>
@@ -12437,7 +12650,7 @@
           <p:cNvPr id="2" name="Nadpis 1">
             <a:extLst>
               <a:ext uri="{FF2B5EF4-FFF2-40B4-BE49-F238E27FC236}">
-                <a16:creationId xmlns:a16="http://schemas.microsoft.com/office/drawing/2014/main" id="{376F3698-068D-49FD-AACF-4EAE8BDDC3C3}"/>
+                <a16:creationId xmlns:a16="http://schemas.microsoft.com/office/drawing/2014/main" xmlns="" id="{376F3698-068D-49FD-AACF-4EAE8BDDC3C3}"/>
               </a:ext>
             </a:extLst>
           </p:cNvPr>
@@ -12469,7 +12682,7 @@
           <p:cNvPr id="3" name="Zástupný objekt pre obsah 2">
             <a:extLst>
               <a:ext uri="{FF2B5EF4-FFF2-40B4-BE49-F238E27FC236}">
-                <a16:creationId xmlns:a16="http://schemas.microsoft.com/office/drawing/2014/main" id="{61374358-B7B0-43A8-8E16-42094ACF0BB3}"/>
+                <a16:creationId xmlns:a16="http://schemas.microsoft.com/office/drawing/2014/main" xmlns="" id="{61374358-B7B0-43A8-8E16-42094ACF0BB3}"/>
               </a:ext>
             </a:extLst>
           </p:cNvPr>
@@ -12543,7 +12756,7 @@
           <p:cNvPr id="4" name="Obrázok 3">
             <a:extLst>
               <a:ext uri="{FF2B5EF4-FFF2-40B4-BE49-F238E27FC236}">
-                <a16:creationId xmlns:a16="http://schemas.microsoft.com/office/drawing/2014/main" id="{38FC6C7C-7EE4-4B16-87B1-6861D7A562A8}"/>
+                <a16:creationId xmlns:a16="http://schemas.microsoft.com/office/drawing/2014/main" xmlns="" id="{38FC6C7C-7EE4-4B16-87B1-6861D7A562A8}"/>
               </a:ext>
             </a:extLst>
           </p:cNvPr>
@@ -12603,7 +12816,7 @@
           <p:cNvPr id="2" name="Nadpis 1">
             <a:extLst>
               <a:ext uri="{FF2B5EF4-FFF2-40B4-BE49-F238E27FC236}">
-                <a16:creationId xmlns:a16="http://schemas.microsoft.com/office/drawing/2014/main" id="{7D3C4C67-FE21-482B-882A-3F45D2C25492}"/>
+                <a16:creationId xmlns:a16="http://schemas.microsoft.com/office/drawing/2014/main" xmlns="" id="{7D3C4C67-FE21-482B-882A-3F45D2C25492}"/>
               </a:ext>
             </a:extLst>
           </p:cNvPr>
@@ -12633,7 +12846,7 @@
               <p:cNvPr id="3" name="Zástupný objekt pre obsah 2">
                 <a:extLst>
                   <a:ext uri="{FF2B5EF4-FFF2-40B4-BE49-F238E27FC236}">
-                    <a16:creationId xmlns:a16="http://schemas.microsoft.com/office/drawing/2014/main" id="{AB55F026-7DFF-4CEE-8D76-88717C8746FB}"/>
+                    <a16:creationId xmlns:a16="http://schemas.microsoft.com/office/drawing/2014/main" xmlns="" id="{AB55F026-7DFF-4CEE-8D76-88717C8746FB}"/>
                   </a:ext>
                 </a:extLst>
               </p:cNvPr>
@@ -14415,7 +14628,7 @@
           <p:cNvPr id="4" name="Object 67">
             <a:extLst>
               <a:ext uri="{FF2B5EF4-FFF2-40B4-BE49-F238E27FC236}">
-                <a16:creationId xmlns:a16="http://schemas.microsoft.com/office/drawing/2014/main" id="{17E48AF6-385C-44D4-B21F-22645EDDB021}"/>
+                <a16:creationId xmlns:a16="http://schemas.microsoft.com/office/drawing/2014/main" xmlns="" id="{17E48AF6-385C-44D4-B21F-22645EDDB021}"/>
               </a:ext>
             </a:extLst>
           </p:cNvPr>
@@ -14438,7 +14651,7 @@
           <a:graphicData uri="http://schemas.openxmlformats.org/presentationml/2006/ole">
             <mc:AlternateContent xmlns:mc="http://schemas.openxmlformats.org/markup-compatibility/2006">
               <mc:Choice xmlns:v="urn:schemas-microsoft-com:vml" Requires="v">
-                <p:oleObj spid="_x0000_s7193" name="Document" r:id="rId4" imgW="5650865" imgH="1318260" progId="Word.Document.8">
+                <p:oleObj spid="_x0000_s7196" name="Document" r:id="rId4" imgW="5650865" imgH="1318260" progId="Word.Document.8">
                   <p:embed/>
                 </p:oleObj>
               </mc:Choice>
@@ -14523,7 +14736,7 @@
           <p:cNvPr id="2" name="Nadpis 1">
             <a:extLst>
               <a:ext uri="{FF2B5EF4-FFF2-40B4-BE49-F238E27FC236}">
-                <a16:creationId xmlns:a16="http://schemas.microsoft.com/office/drawing/2014/main" id="{A60D084F-ACFD-4F46-B5DB-65DDF10CFCE9}"/>
+                <a16:creationId xmlns:a16="http://schemas.microsoft.com/office/drawing/2014/main" xmlns="" id="{A60D084F-ACFD-4F46-B5DB-65DDF10CFCE9}"/>
               </a:ext>
             </a:extLst>
           </p:cNvPr>
@@ -14548,14 +14761,14 @@
           </a:p>
         </p:txBody>
       </p:sp>
-      <mc:AlternateContent xmlns:mc="http://schemas.openxmlformats.org/markup-compatibility/2006" xmlns:a14="http://schemas.microsoft.com/office/drawing/2010/main">
-        <mc:Choice Requires="a14">
+      <mc:AlternateContent xmlns:mc="http://schemas.openxmlformats.org/markup-compatibility/2006">
+        <mc:Choice xmlns:a14="http://schemas.microsoft.com/office/drawing/2010/main" Requires="a14">
           <p:sp>
             <p:nvSpPr>
               <p:cNvPr id="3" name="Zástupný objekt pre obsah 2">
                 <a:extLst>
                   <a:ext uri="{FF2B5EF4-FFF2-40B4-BE49-F238E27FC236}">
-                    <a16:creationId xmlns:a16="http://schemas.microsoft.com/office/drawing/2014/main" id="{A74476A0-8C3D-4B4B-ABC1-78C4925E54B4}"/>
+                    <a16:creationId xmlns:a16="http://schemas.microsoft.com/office/drawing/2014/main" xmlns="" id="{A74476A0-8C3D-4B4B-ABC1-78C4925E54B4}"/>
                   </a:ext>
                 </a:extLst>
               </p:cNvPr>
@@ -14600,7 +14813,23 @@
                       <a:schemeClr val="tx1"/>
                     </a:solidFill>
                   </a:rPr>
-                  <a:t>– najdôležitejšia podmienka správnej činnosti URO</a:t>
+                  <a:t>– najdôležitejšia </a:t>
+                </a:r>
+                <a:r>
+                  <a:rPr lang="sk-SK" sz="2100" dirty="0" smtClean="0">
+                    <a:solidFill>
+                      <a:schemeClr val="tx1"/>
+                    </a:solidFill>
+                  </a:rPr>
+                  <a:t>podmienka </a:t>
+                </a:r>
+                <a:r>
+                  <a:rPr lang="sk-SK" sz="2100" dirty="0">
+                    <a:solidFill>
+                      <a:schemeClr val="tx1"/>
+                    </a:solidFill>
+                  </a:rPr>
+                  <a:t>správnej činnosti URO</a:t>
                 </a:r>
               </a:p>
               <a:p>
@@ -14968,13 +15197,13 @@
             </p:txBody>
           </p:sp>
         </mc:Choice>
-        <mc:Fallback xmlns="">
+        <mc:Fallback>
           <p:sp>
             <p:nvSpPr>
               <p:cNvPr id="3" name="Zástupný objekt pre obsah 2">
                 <a:extLst>
                   <a:ext uri="{FF2B5EF4-FFF2-40B4-BE49-F238E27FC236}">
-                    <a16:creationId xmlns:a16="http://schemas.microsoft.com/office/drawing/2014/main" id="{A74476A0-8C3D-4B4B-ABC1-78C4925E54B4}"/>
+                    <a16:creationId xmlns:a16="http://schemas.microsoft.com/office/drawing/2014/main" xmlns:a14="http://schemas.microsoft.com/office/drawing/2010/main" xmlns="" id="{A74476A0-8C3D-4B4B-ABC1-78C4925E54B4}"/>
                   </a:ext>
                 </a:extLst>
               </p:cNvPr>
@@ -14990,10 +15219,10 @@
                 <a:off x="393700" y="1139572"/>
                 <a:ext cx="8356599" cy="5195254"/>
               </a:xfrm>
-              <a:blipFill>
+              <a:blipFill rotWithShape="0">
                 <a:blip r:embed="rId2"/>
                 <a:stretch>
-                  <a:fillRect l="-1752" t="-1995"/>
+                  <a:fillRect l="-1898" t="-1995"/>
                 </a:stretch>
               </a:blipFill>
             </p:spPr>
@@ -15047,7 +15276,7 @@
           <p:cNvPr id="2" name="Nadpis 1">
             <a:extLst>
               <a:ext uri="{FF2B5EF4-FFF2-40B4-BE49-F238E27FC236}">
-                <a16:creationId xmlns:a16="http://schemas.microsoft.com/office/drawing/2014/main" id="{FBFC6400-6E46-4698-96F8-B212193EA216}"/>
+                <a16:creationId xmlns:a16="http://schemas.microsoft.com/office/drawing/2014/main" xmlns="" id="{FBFC6400-6E46-4698-96F8-B212193EA216}"/>
               </a:ext>
             </a:extLst>
           </p:cNvPr>
@@ -15077,7 +15306,7 @@
               <p:cNvPr id="3" name="Zástupný objekt pre obsah 2">
                 <a:extLst>
                   <a:ext uri="{FF2B5EF4-FFF2-40B4-BE49-F238E27FC236}">
-                    <a16:creationId xmlns:a16="http://schemas.microsoft.com/office/drawing/2014/main" id="{FEB4A2EF-D025-4F80-B248-076E6286AC84}"/>
+                    <a16:creationId xmlns:a16="http://schemas.microsoft.com/office/drawing/2014/main" xmlns="" id="{FEB4A2EF-D025-4F80-B248-076E6286AC84}"/>
                   </a:ext>
                 </a:extLst>
               </p:cNvPr>
@@ -17008,7 +17237,7 @@
           <p:cNvPr id="2" name="Nadpis 1">
             <a:extLst>
               <a:ext uri="{FF2B5EF4-FFF2-40B4-BE49-F238E27FC236}">
-                <a16:creationId xmlns:a16="http://schemas.microsoft.com/office/drawing/2014/main" id="{3BD6FFB2-FFD5-4E8E-91CB-F660C4AE22C3}"/>
+                <a16:creationId xmlns:a16="http://schemas.microsoft.com/office/drawing/2014/main" xmlns="" id="{3BD6FFB2-FFD5-4E8E-91CB-F660C4AE22C3}"/>
               </a:ext>
             </a:extLst>
           </p:cNvPr>
@@ -17036,7 +17265,7 @@
           <p:cNvPr id="3" name="Zástupný objekt pre obsah 2">
             <a:extLst>
               <a:ext uri="{FF2B5EF4-FFF2-40B4-BE49-F238E27FC236}">
-                <a16:creationId xmlns:a16="http://schemas.microsoft.com/office/drawing/2014/main" id="{3DFD6BEC-22B4-4219-AFA0-5FE2E8F68204}"/>
+                <a16:creationId xmlns:a16="http://schemas.microsoft.com/office/drawing/2014/main" xmlns="" id="{3DFD6BEC-22B4-4219-AFA0-5FE2E8F68204}"/>
               </a:ext>
             </a:extLst>
           </p:cNvPr>
@@ -17061,7 +17290,7 @@
           <p:cNvPr id="4" name="Obrázok 3">
             <a:extLst>
               <a:ext uri="{FF2B5EF4-FFF2-40B4-BE49-F238E27FC236}">
-                <a16:creationId xmlns:a16="http://schemas.microsoft.com/office/drawing/2014/main" id="{FD3215DE-CDD1-4E00-B953-579FCDAE9D6B}"/>
+                <a16:creationId xmlns:a16="http://schemas.microsoft.com/office/drawing/2014/main" xmlns="" id="{FD3215DE-CDD1-4E00-B953-579FCDAE9D6B}"/>
               </a:ext>
             </a:extLst>
           </p:cNvPr>
@@ -17121,7 +17350,7 @@
           <p:cNvPr id="2" name="Nadpis 1">
             <a:extLst>
               <a:ext uri="{FF2B5EF4-FFF2-40B4-BE49-F238E27FC236}">
-                <a16:creationId xmlns:a16="http://schemas.microsoft.com/office/drawing/2014/main" id="{1BC48521-60C5-4BFF-B5C5-0525A5CC6C1A}"/>
+                <a16:creationId xmlns:a16="http://schemas.microsoft.com/office/drawing/2014/main" xmlns="" id="{1BC48521-60C5-4BFF-B5C5-0525A5CC6C1A}"/>
               </a:ext>
             </a:extLst>
           </p:cNvPr>
@@ -17149,7 +17378,7 @@
           <p:cNvPr id="3" name="Zástupný objekt pre obsah 2">
             <a:extLst>
               <a:ext uri="{FF2B5EF4-FFF2-40B4-BE49-F238E27FC236}">
-                <a16:creationId xmlns:a16="http://schemas.microsoft.com/office/drawing/2014/main" id="{0883CE9F-6DCB-453E-88AF-15FC06EE4697}"/>
+                <a16:creationId xmlns:a16="http://schemas.microsoft.com/office/drawing/2014/main" xmlns="" id="{0883CE9F-6DCB-453E-88AF-15FC06EE4697}"/>
               </a:ext>
             </a:extLst>
           </p:cNvPr>
@@ -17174,7 +17403,7 @@
           <p:cNvPr id="5" name="Obrázok 4">
             <a:extLst>
               <a:ext uri="{FF2B5EF4-FFF2-40B4-BE49-F238E27FC236}">
-                <a16:creationId xmlns:a16="http://schemas.microsoft.com/office/drawing/2014/main" id="{DE8A9E34-32CB-4750-9796-9959DAD0ECCA}"/>
+                <a16:creationId xmlns:a16="http://schemas.microsoft.com/office/drawing/2014/main" xmlns="" id="{DE8A9E34-32CB-4750-9796-9959DAD0ECCA}"/>
               </a:ext>
             </a:extLst>
           </p:cNvPr>
@@ -17234,7 +17463,7 @@
           <p:cNvPr id="2" name="Nadpis 1">
             <a:extLst>
               <a:ext uri="{FF2B5EF4-FFF2-40B4-BE49-F238E27FC236}">
-                <a16:creationId xmlns:a16="http://schemas.microsoft.com/office/drawing/2014/main" id="{EBD99FF8-3A38-41E9-959A-D0CBA305E39E}"/>
+                <a16:creationId xmlns:a16="http://schemas.microsoft.com/office/drawing/2014/main" xmlns="" id="{EBD99FF8-3A38-41E9-959A-D0CBA305E39E}"/>
               </a:ext>
             </a:extLst>
           </p:cNvPr>
@@ -17266,7 +17495,7 @@
           <p:cNvPr id="3" name="Zástupný objekt pre obsah 2">
             <a:extLst>
               <a:ext uri="{FF2B5EF4-FFF2-40B4-BE49-F238E27FC236}">
-                <a16:creationId xmlns:a16="http://schemas.microsoft.com/office/drawing/2014/main" id="{2EF5C433-B661-4BBA-B904-C28E6343F10A}"/>
+                <a16:creationId xmlns:a16="http://schemas.microsoft.com/office/drawing/2014/main" xmlns="" id="{2EF5C433-B661-4BBA-B904-C28E6343F10A}"/>
               </a:ext>
             </a:extLst>
           </p:cNvPr>
@@ -17335,7 +17564,7 @@
           <p:cNvPr id="4" name="Obrázok 3">
             <a:extLst>
               <a:ext uri="{FF2B5EF4-FFF2-40B4-BE49-F238E27FC236}">
-                <a16:creationId xmlns:a16="http://schemas.microsoft.com/office/drawing/2014/main" id="{943240A9-FF42-4D11-ACB9-702CBDF40FA2}"/>
+                <a16:creationId xmlns:a16="http://schemas.microsoft.com/office/drawing/2014/main" xmlns="" id="{943240A9-FF42-4D11-ACB9-702CBDF40FA2}"/>
               </a:ext>
             </a:extLst>
           </p:cNvPr>
@@ -17395,7 +17624,7 @@
           <p:cNvPr id="2" name="Nadpis 1">
             <a:extLst>
               <a:ext uri="{FF2B5EF4-FFF2-40B4-BE49-F238E27FC236}">
-                <a16:creationId xmlns:a16="http://schemas.microsoft.com/office/drawing/2014/main" id="{E4F41EF0-6E94-47D0-8306-A668C9E61023}"/>
+                <a16:creationId xmlns:a16="http://schemas.microsoft.com/office/drawing/2014/main" xmlns="" id="{E4F41EF0-6E94-47D0-8306-A668C9E61023}"/>
               </a:ext>
             </a:extLst>
           </p:cNvPr>
@@ -17427,7 +17656,7 @@
           <p:cNvPr id="6" name="Zástupný objekt pre obsah 5">
             <a:extLst>
               <a:ext uri="{FF2B5EF4-FFF2-40B4-BE49-F238E27FC236}">
-                <a16:creationId xmlns:a16="http://schemas.microsoft.com/office/drawing/2014/main" id="{107D091F-86FE-4331-B584-A447934F1142}"/>
+                <a16:creationId xmlns:a16="http://schemas.microsoft.com/office/drawing/2014/main" xmlns="" id="{107D091F-86FE-4331-B584-A447934F1142}"/>
               </a:ext>
             </a:extLst>
           </p:cNvPr>
@@ -17504,7 +17733,7 @@
           <p:cNvPr id="7" name="Obrázok 6">
             <a:extLst>
               <a:ext uri="{FF2B5EF4-FFF2-40B4-BE49-F238E27FC236}">
-                <a16:creationId xmlns:a16="http://schemas.microsoft.com/office/drawing/2014/main" id="{7D75BD76-252C-4AA7-ADAA-A227ECBD6785}"/>
+                <a16:creationId xmlns:a16="http://schemas.microsoft.com/office/drawing/2014/main" xmlns="" id="{7D75BD76-252C-4AA7-ADAA-A227ECBD6785}"/>
               </a:ext>
             </a:extLst>
           </p:cNvPr>
@@ -17564,7 +17793,7 @@
           <p:cNvPr id="2" name="Nadpis 1">
             <a:extLst>
               <a:ext uri="{FF2B5EF4-FFF2-40B4-BE49-F238E27FC236}">
-                <a16:creationId xmlns:a16="http://schemas.microsoft.com/office/drawing/2014/main" id="{47EFFD93-70B2-4F57-ABD0-1F048EF2B536}"/>
+                <a16:creationId xmlns:a16="http://schemas.microsoft.com/office/drawing/2014/main" xmlns="" id="{47EFFD93-70B2-4F57-ABD0-1F048EF2B536}"/>
               </a:ext>
             </a:extLst>
           </p:cNvPr>
@@ -17594,7 +17823,7 @@
               <p:cNvPr id="3" name="Zástupný objekt pre obsah 2">
                 <a:extLst>
                   <a:ext uri="{FF2B5EF4-FFF2-40B4-BE49-F238E27FC236}">
-                    <a16:creationId xmlns:a16="http://schemas.microsoft.com/office/drawing/2014/main" id="{36F3FA68-0BFD-4A5E-942C-5CD612E450E4}"/>
+                    <a16:creationId xmlns:a16="http://schemas.microsoft.com/office/drawing/2014/main" xmlns="" id="{36F3FA68-0BFD-4A5E-942C-5CD612E450E4}"/>
                   </a:ext>
                 </a:extLst>
               </p:cNvPr>
@@ -19285,7 +19514,7 @@
           <p:cNvPr id="4" name="Obrázok 3">
             <a:extLst>
               <a:ext uri="{FF2B5EF4-FFF2-40B4-BE49-F238E27FC236}">
-                <a16:creationId xmlns:a16="http://schemas.microsoft.com/office/drawing/2014/main" id="{DC44B785-E8EF-4922-AA4C-173FF3856B07}"/>
+                <a16:creationId xmlns:a16="http://schemas.microsoft.com/office/drawing/2014/main" xmlns="" id="{DC44B785-E8EF-4922-AA4C-173FF3856B07}"/>
               </a:ext>
             </a:extLst>
           </p:cNvPr>
@@ -19345,7 +19574,7 @@
           <p:cNvPr id="2" name="Nadpis 1">
             <a:extLst>
               <a:ext uri="{FF2B5EF4-FFF2-40B4-BE49-F238E27FC236}">
-                <a16:creationId xmlns:a16="http://schemas.microsoft.com/office/drawing/2014/main" id="{3A22347B-6182-4E31-B320-A4B70244AFC1}"/>
+                <a16:creationId xmlns:a16="http://schemas.microsoft.com/office/drawing/2014/main" xmlns="" id="{3A22347B-6182-4E31-B320-A4B70244AFC1}"/>
               </a:ext>
             </a:extLst>
           </p:cNvPr>
@@ -19375,7 +19604,7 @@
               <p:cNvPr id="3" name="Zástupný objekt pre obsah 2">
                 <a:extLst>
                   <a:ext uri="{FF2B5EF4-FFF2-40B4-BE49-F238E27FC236}">
-                    <a16:creationId xmlns:a16="http://schemas.microsoft.com/office/drawing/2014/main" id="{B1A9D08C-2B9E-41F4-989C-0B3C6883F68B}"/>
+                    <a16:creationId xmlns:a16="http://schemas.microsoft.com/office/drawing/2014/main" xmlns="" id="{B1A9D08C-2B9E-41F4-989C-0B3C6883F68B}"/>
                   </a:ext>
                 </a:extLst>
               </p:cNvPr>
@@ -19764,7 +19993,7 @@
           <p:cNvPr id="4" name="Obrázok 3">
             <a:extLst>
               <a:ext uri="{FF2B5EF4-FFF2-40B4-BE49-F238E27FC236}">
-                <a16:creationId xmlns:a16="http://schemas.microsoft.com/office/drawing/2014/main" id="{90CA61D8-A46A-46EF-B80F-1BA588A956E1}"/>
+                <a16:creationId xmlns:a16="http://schemas.microsoft.com/office/drawing/2014/main" xmlns="" id="{90CA61D8-A46A-46EF-B80F-1BA588A956E1}"/>
               </a:ext>
             </a:extLst>
           </p:cNvPr>
@@ -19824,7 +20053,7 @@
           <p:cNvPr id="2" name="Nadpis 1">
             <a:extLst>
               <a:ext uri="{FF2B5EF4-FFF2-40B4-BE49-F238E27FC236}">
-                <a16:creationId xmlns:a16="http://schemas.microsoft.com/office/drawing/2014/main" id="{B05B046A-427B-4B79-BC83-96156D9E8A3A}"/>
+                <a16:creationId xmlns:a16="http://schemas.microsoft.com/office/drawing/2014/main" xmlns="" id="{B05B046A-427B-4B79-BC83-96156D9E8A3A}"/>
               </a:ext>
             </a:extLst>
           </p:cNvPr>
@@ -19854,7 +20083,7 @@
               <p:cNvPr id="3" name="Zástupný objekt pre obsah 2">
                 <a:extLst>
                   <a:ext uri="{FF2B5EF4-FFF2-40B4-BE49-F238E27FC236}">
-                    <a16:creationId xmlns:a16="http://schemas.microsoft.com/office/drawing/2014/main" id="{1BC96586-D039-4A8D-8882-460073AA4BD9}"/>
+                    <a16:creationId xmlns:a16="http://schemas.microsoft.com/office/drawing/2014/main" xmlns="" id="{1BC96586-D039-4A8D-8882-460073AA4BD9}"/>
                   </a:ext>
                 </a:extLst>
               </p:cNvPr>
@@ -21583,7 +21812,7 @@
           <p:cNvPr id="6" name="Zástupný objekt pre obsah 3">
             <a:extLst>
               <a:ext uri="{FF2B5EF4-FFF2-40B4-BE49-F238E27FC236}">
-                <a16:creationId xmlns:a16="http://schemas.microsoft.com/office/drawing/2014/main" id="{376F8090-F7B6-4BA4-9A0A-D50EBCC2B080}"/>
+                <a16:creationId xmlns:a16="http://schemas.microsoft.com/office/drawing/2014/main" xmlns="" id="{376F8090-F7B6-4BA4-9A0A-D50EBCC2B080}"/>
               </a:ext>
             </a:extLst>
           </p:cNvPr>
@@ -21643,7 +21872,7 @@
           <p:cNvPr id="2" name="Nadpis 1">
             <a:extLst>
               <a:ext uri="{FF2B5EF4-FFF2-40B4-BE49-F238E27FC236}">
-                <a16:creationId xmlns:a16="http://schemas.microsoft.com/office/drawing/2014/main" id="{34FBD8C7-1AF9-49DB-B3E4-1C0F1CDF5BB2}"/>
+                <a16:creationId xmlns:a16="http://schemas.microsoft.com/office/drawing/2014/main" xmlns="" id="{34FBD8C7-1AF9-49DB-B3E4-1C0F1CDF5BB2}"/>
               </a:ext>
             </a:extLst>
           </p:cNvPr>
@@ -21671,7 +21900,7 @@
           <p:cNvPr id="4" name="Zástupný objekt pre obsah 3">
             <a:extLst>
               <a:ext uri="{FF2B5EF4-FFF2-40B4-BE49-F238E27FC236}">
-                <a16:creationId xmlns:a16="http://schemas.microsoft.com/office/drawing/2014/main" id="{BDB96DC8-73A4-4919-8B7C-FC0BB64CF926}"/>
+                <a16:creationId xmlns:a16="http://schemas.microsoft.com/office/drawing/2014/main" xmlns="" id="{BDB96DC8-73A4-4919-8B7C-FC0BB64CF926}"/>
               </a:ext>
             </a:extLst>
           </p:cNvPr>
@@ -21733,7 +21962,7 @@
           <p:cNvPr id="2" name="Nadpis 1">
             <a:extLst>
               <a:ext uri="{FF2B5EF4-FFF2-40B4-BE49-F238E27FC236}">
-                <a16:creationId xmlns:a16="http://schemas.microsoft.com/office/drawing/2014/main" id="{10F77A38-6BBA-40AE-BCE9-6D5FDEB023B4}"/>
+                <a16:creationId xmlns:a16="http://schemas.microsoft.com/office/drawing/2014/main" xmlns="" id="{10F77A38-6BBA-40AE-BCE9-6D5FDEB023B4}"/>
               </a:ext>
             </a:extLst>
           </p:cNvPr>
@@ -21766,7 +21995,7 @@
           <p:cNvPr id="4" name="Zástupný objekt pre obsah 3">
             <a:extLst>
               <a:ext uri="{FF2B5EF4-FFF2-40B4-BE49-F238E27FC236}">
-                <a16:creationId xmlns:a16="http://schemas.microsoft.com/office/drawing/2014/main" id="{DEC0E1D8-C219-405F-8546-F4C7D1419B67}"/>
+                <a16:creationId xmlns:a16="http://schemas.microsoft.com/office/drawing/2014/main" xmlns="" id="{DEC0E1D8-C219-405F-8546-F4C7D1419B67}"/>
               </a:ext>
             </a:extLst>
           </p:cNvPr>
@@ -21828,7 +22057,7 @@
           <p:cNvPr id="2" name="Nadpis 1">
             <a:extLst>
               <a:ext uri="{FF2B5EF4-FFF2-40B4-BE49-F238E27FC236}">
-                <a16:creationId xmlns:a16="http://schemas.microsoft.com/office/drawing/2014/main" id="{59DC17C1-419D-44F2-987B-AD5E29D750B8}"/>
+                <a16:creationId xmlns:a16="http://schemas.microsoft.com/office/drawing/2014/main" xmlns="" id="{59DC17C1-419D-44F2-987B-AD5E29D750B8}"/>
               </a:ext>
             </a:extLst>
           </p:cNvPr>
@@ -21856,7 +22085,7 @@
           <p:cNvPr id="3" name="Zástupný objekt pre obsah 2">
             <a:extLst>
               <a:ext uri="{FF2B5EF4-FFF2-40B4-BE49-F238E27FC236}">
-                <a16:creationId xmlns:a16="http://schemas.microsoft.com/office/drawing/2014/main" id="{5BD42F2B-ABA1-4F3A-865F-32330FB152D7}"/>
+                <a16:creationId xmlns:a16="http://schemas.microsoft.com/office/drawing/2014/main" xmlns="" id="{5BD42F2B-ABA1-4F3A-865F-32330FB152D7}"/>
               </a:ext>
             </a:extLst>
           </p:cNvPr>
@@ -21993,7 +22222,7 @@
               <p:cNvPr id="5" name="Obdĺžnik 4">
                 <a:extLst>
                   <a:ext uri="{FF2B5EF4-FFF2-40B4-BE49-F238E27FC236}">
-                    <a16:creationId xmlns:a16="http://schemas.microsoft.com/office/drawing/2014/main" id="{0FF2FFA7-311A-4B9F-B814-893A4838989A}"/>
+                    <a16:creationId xmlns:a16="http://schemas.microsoft.com/office/drawing/2014/main" xmlns="" id="{0FF2FFA7-311A-4B9F-B814-893A4838989A}"/>
                   </a:ext>
                 </a:extLst>
               </p:cNvPr>
@@ -22172,7 +22401,7 @@
               <p:cNvPr id="6" name="Obdĺžnik 5">
                 <a:extLst>
                   <a:ext uri="{FF2B5EF4-FFF2-40B4-BE49-F238E27FC236}">
-                    <a16:creationId xmlns:a16="http://schemas.microsoft.com/office/drawing/2014/main" id="{4FE65B7E-56DF-4D10-88D1-2C900EF42A86}"/>
+                    <a16:creationId xmlns:a16="http://schemas.microsoft.com/office/drawing/2014/main" xmlns="" id="{4FE65B7E-56DF-4D10-88D1-2C900EF42A86}"/>
                   </a:ext>
                 </a:extLst>
               </p:cNvPr>
@@ -22361,7 +22590,7 @@
           <p:cNvPr id="8" name="Obrázok 7">
             <a:extLst>
               <a:ext uri="{FF2B5EF4-FFF2-40B4-BE49-F238E27FC236}">
-                <a16:creationId xmlns:a16="http://schemas.microsoft.com/office/drawing/2014/main" id="{6BDBCC83-5F18-4F72-8184-1662F6566AE1}"/>
+                <a16:creationId xmlns:a16="http://schemas.microsoft.com/office/drawing/2014/main" xmlns="" id="{6BDBCC83-5F18-4F72-8184-1662F6566AE1}"/>
               </a:ext>
             </a:extLst>
           </p:cNvPr>
@@ -22496,7 +22725,7 @@
           <p:cNvPr id="2" name="Nadpis 1">
             <a:extLst>
               <a:ext uri="{FF2B5EF4-FFF2-40B4-BE49-F238E27FC236}">
-                <a16:creationId xmlns:a16="http://schemas.microsoft.com/office/drawing/2014/main" id="{A8D95754-7B46-4FB1-8CC3-0AACD4BA7E9F}"/>
+                <a16:creationId xmlns:a16="http://schemas.microsoft.com/office/drawing/2014/main" xmlns="" id="{A8D95754-7B46-4FB1-8CC3-0AACD4BA7E9F}"/>
               </a:ext>
             </a:extLst>
           </p:cNvPr>
@@ -22528,7 +22757,7 @@
           <p:cNvPr id="3" name="Zástupný objekt pre obsah 2">
             <a:extLst>
               <a:ext uri="{FF2B5EF4-FFF2-40B4-BE49-F238E27FC236}">
-                <a16:creationId xmlns:a16="http://schemas.microsoft.com/office/drawing/2014/main" id="{8E23EFDD-9FBF-46FA-BC29-6B37ADFE1D99}"/>
+                <a16:creationId xmlns:a16="http://schemas.microsoft.com/office/drawing/2014/main" xmlns="" id="{8E23EFDD-9FBF-46FA-BC29-6B37ADFE1D99}"/>
               </a:ext>
             </a:extLst>
           </p:cNvPr>
@@ -22605,7 +22834,7 @@
           <p:cNvPr id="5" name="Obrázok 4">
             <a:extLst>
               <a:ext uri="{FF2B5EF4-FFF2-40B4-BE49-F238E27FC236}">
-                <a16:creationId xmlns:a16="http://schemas.microsoft.com/office/drawing/2014/main" id="{605D33CC-48FD-468A-A728-E806B3621887}"/>
+                <a16:creationId xmlns:a16="http://schemas.microsoft.com/office/drawing/2014/main" xmlns="" id="{605D33CC-48FD-468A-A728-E806B3621887}"/>
               </a:ext>
             </a:extLst>
           </p:cNvPr>
@@ -22665,7 +22894,7 @@
           <p:cNvPr id="2" name="Nadpis 1">
             <a:extLst>
               <a:ext uri="{FF2B5EF4-FFF2-40B4-BE49-F238E27FC236}">
-                <a16:creationId xmlns:a16="http://schemas.microsoft.com/office/drawing/2014/main" id="{376F3698-068D-49FD-AACF-4EAE8BDDC3C3}"/>
+                <a16:creationId xmlns:a16="http://schemas.microsoft.com/office/drawing/2014/main" xmlns="" id="{376F3698-068D-49FD-AACF-4EAE8BDDC3C3}"/>
               </a:ext>
             </a:extLst>
           </p:cNvPr>
@@ -22713,7 +22942,7 @@
           <p:cNvPr id="3" name="Zástupný objekt pre obsah 2">
             <a:extLst>
               <a:ext uri="{FF2B5EF4-FFF2-40B4-BE49-F238E27FC236}">
-                <a16:creationId xmlns:a16="http://schemas.microsoft.com/office/drawing/2014/main" id="{61374358-B7B0-43A8-8E16-42094ACF0BB3}"/>
+                <a16:creationId xmlns:a16="http://schemas.microsoft.com/office/drawing/2014/main" xmlns="" id="{61374358-B7B0-43A8-8E16-42094ACF0BB3}"/>
               </a:ext>
             </a:extLst>
           </p:cNvPr>
@@ -22787,7 +23016,7 @@
           <p:cNvPr id="5" name="Obrázok 4">
             <a:extLst>
               <a:ext uri="{FF2B5EF4-FFF2-40B4-BE49-F238E27FC236}">
-                <a16:creationId xmlns:a16="http://schemas.microsoft.com/office/drawing/2014/main" id="{AE0DC47A-04EB-49BB-BEAA-FA704F6406D6}"/>
+                <a16:creationId xmlns:a16="http://schemas.microsoft.com/office/drawing/2014/main" xmlns="" id="{AE0DC47A-04EB-49BB-BEAA-FA704F6406D6}"/>
               </a:ext>
             </a:extLst>
           </p:cNvPr>
@@ -22847,7 +23076,7 @@
           <p:cNvPr id="2" name="Nadpis 1">
             <a:extLst>
               <a:ext uri="{FF2B5EF4-FFF2-40B4-BE49-F238E27FC236}">
-                <a16:creationId xmlns:a16="http://schemas.microsoft.com/office/drawing/2014/main" id="{5DAF6CEF-1A94-4383-BA33-A865F973BED8}"/>
+                <a16:creationId xmlns:a16="http://schemas.microsoft.com/office/drawing/2014/main" xmlns="" id="{5DAF6CEF-1A94-4383-BA33-A865F973BED8}"/>
               </a:ext>
             </a:extLst>
           </p:cNvPr>
@@ -22877,7 +23106,7 @@
           <p:cNvPr id="3" name="Zástupný objekt pre obsah 2">
             <a:extLst>
               <a:ext uri="{FF2B5EF4-FFF2-40B4-BE49-F238E27FC236}">
-                <a16:creationId xmlns:a16="http://schemas.microsoft.com/office/drawing/2014/main" id="{2FB1C415-06C1-4F12-987A-4B53F0A351C8}"/>
+                <a16:creationId xmlns:a16="http://schemas.microsoft.com/office/drawing/2014/main" xmlns="" id="{2FB1C415-06C1-4F12-987A-4B53F0A351C8}"/>
               </a:ext>
             </a:extLst>
           </p:cNvPr>
@@ -23130,7 +23359,7 @@
               <p:cNvPr id="5" name="Obdĺžnik 4">
                 <a:extLst>
                   <a:ext uri="{FF2B5EF4-FFF2-40B4-BE49-F238E27FC236}">
-                    <a16:creationId xmlns:a16="http://schemas.microsoft.com/office/drawing/2014/main" id="{F64D1C35-B370-4EB5-823D-534596419ADF}"/>
+                    <a16:creationId xmlns:a16="http://schemas.microsoft.com/office/drawing/2014/main" xmlns="" id="{F64D1C35-B370-4EB5-823D-534596419ADF}"/>
                   </a:ext>
                 </a:extLst>
               </p:cNvPr>
@@ -23311,7 +23540,7 @@
           <p:cNvPr id="6" name="Obrázok 5">
             <a:extLst>
               <a:ext uri="{FF2B5EF4-FFF2-40B4-BE49-F238E27FC236}">
-                <a16:creationId xmlns:a16="http://schemas.microsoft.com/office/drawing/2014/main" id="{294E46B8-F0E7-4189-A26A-73AAD96DC1E2}"/>
+                <a16:creationId xmlns:a16="http://schemas.microsoft.com/office/drawing/2014/main" xmlns="" id="{294E46B8-F0E7-4189-A26A-73AAD96DC1E2}"/>
               </a:ext>
             </a:extLst>
           </p:cNvPr>
@@ -23494,7 +23723,7 @@
           <p:cNvPr id="2" name="Nadpis 1">
             <a:extLst>
               <a:ext uri="{FF2B5EF4-FFF2-40B4-BE49-F238E27FC236}">
-                <a16:creationId xmlns:a16="http://schemas.microsoft.com/office/drawing/2014/main" id="{E9C4539A-6E61-4B4E-BD41-030CAE3ED183}"/>
+                <a16:creationId xmlns:a16="http://schemas.microsoft.com/office/drawing/2014/main" xmlns="" id="{E9C4539A-6E61-4B4E-BD41-030CAE3ED183}"/>
               </a:ext>
             </a:extLst>
           </p:cNvPr>
@@ -23526,7 +23755,7 @@
               <p:cNvPr id="3" name="Zástupný objekt pre obsah 2">
                 <a:extLst>
                   <a:ext uri="{FF2B5EF4-FFF2-40B4-BE49-F238E27FC236}">
-                    <a16:creationId xmlns:a16="http://schemas.microsoft.com/office/drawing/2014/main" id="{ABA3865E-A7BC-471E-8FF6-28FBA9E1873F}"/>
+                    <a16:creationId xmlns:a16="http://schemas.microsoft.com/office/drawing/2014/main" xmlns="" id="{ABA3865E-A7BC-471E-8FF6-28FBA9E1873F}"/>
                   </a:ext>
                 </a:extLst>
               </p:cNvPr>
@@ -25273,7 +25502,7 @@
           <p:cNvPr id="2" name="Nadpis 1">
             <a:extLst>
               <a:ext uri="{FF2B5EF4-FFF2-40B4-BE49-F238E27FC236}">
-                <a16:creationId xmlns:a16="http://schemas.microsoft.com/office/drawing/2014/main" id="{5878579F-C9ED-40AD-AC88-6D87931D7788}"/>
+                <a16:creationId xmlns:a16="http://schemas.microsoft.com/office/drawing/2014/main" xmlns="" id="{5878579F-C9ED-40AD-AC88-6D87931D7788}"/>
               </a:ext>
             </a:extLst>
           </p:cNvPr>
@@ -25312,7 +25541,7 @@
               <p:cNvPr id="3" name="Zástupný objekt pre obsah 2">
                 <a:extLst>
                   <a:ext uri="{FF2B5EF4-FFF2-40B4-BE49-F238E27FC236}">
-                    <a16:creationId xmlns:a16="http://schemas.microsoft.com/office/drawing/2014/main" id="{F492F40C-65DD-47D3-83CF-74E9A4B49B26}"/>
+                    <a16:creationId xmlns:a16="http://schemas.microsoft.com/office/drawing/2014/main" xmlns="" id="{F492F40C-65DD-47D3-83CF-74E9A4B49B26}"/>
                   </a:ext>
                 </a:extLst>
               </p:cNvPr>
@@ -27161,7 +27390,7 @@
           <p:cNvPr id="4" name="Obrázok 3">
             <a:extLst>
               <a:ext uri="{FF2B5EF4-FFF2-40B4-BE49-F238E27FC236}">
-                <a16:creationId xmlns:a16="http://schemas.microsoft.com/office/drawing/2014/main" id="{E1C19574-4F15-4CB1-87AC-97408B629A8B}"/>
+                <a16:creationId xmlns:a16="http://schemas.microsoft.com/office/drawing/2014/main" xmlns="" id="{E1C19574-4F15-4CB1-87AC-97408B629A8B}"/>
               </a:ext>
             </a:extLst>
           </p:cNvPr>
@@ -27221,7 +27450,7 @@
           <p:cNvPr id="2" name="Nadpis 1">
             <a:extLst>
               <a:ext uri="{FF2B5EF4-FFF2-40B4-BE49-F238E27FC236}">
-                <a16:creationId xmlns:a16="http://schemas.microsoft.com/office/drawing/2014/main" id="{6E13DB31-8037-4D1F-A6FC-4630AF949C28}"/>
+                <a16:creationId xmlns:a16="http://schemas.microsoft.com/office/drawing/2014/main" xmlns="" id="{6E13DB31-8037-4D1F-A6FC-4630AF949C28}"/>
               </a:ext>
             </a:extLst>
           </p:cNvPr>
@@ -27258,7 +27487,7 @@
           <p:cNvPr id="3" name="Zástupný objekt pre obsah 2">
             <a:extLst>
               <a:ext uri="{FF2B5EF4-FFF2-40B4-BE49-F238E27FC236}">
-                <a16:creationId xmlns:a16="http://schemas.microsoft.com/office/drawing/2014/main" id="{72806D73-722B-4E81-9170-B9293CDD2F74}"/>
+                <a16:creationId xmlns:a16="http://schemas.microsoft.com/office/drawing/2014/main" xmlns="" id="{72806D73-722B-4E81-9170-B9293CDD2F74}"/>
               </a:ext>
             </a:extLst>
           </p:cNvPr>
@@ -27283,7 +27512,7 @@
           <p:cNvPr id="5" name="Obrázok 4">
             <a:extLst>
               <a:ext uri="{FF2B5EF4-FFF2-40B4-BE49-F238E27FC236}">
-                <a16:creationId xmlns:a16="http://schemas.microsoft.com/office/drawing/2014/main" id="{D7DC7D72-DB29-46D1-862B-5EB35B2B5B05}"/>
+                <a16:creationId xmlns:a16="http://schemas.microsoft.com/office/drawing/2014/main" xmlns="" id="{D7DC7D72-DB29-46D1-862B-5EB35B2B5B05}"/>
               </a:ext>
             </a:extLst>
           </p:cNvPr>
@@ -27343,7 +27572,7 @@
           <p:cNvPr id="2" name="Nadpis 1">
             <a:extLst>
               <a:ext uri="{FF2B5EF4-FFF2-40B4-BE49-F238E27FC236}">
-                <a16:creationId xmlns:a16="http://schemas.microsoft.com/office/drawing/2014/main" id="{1AE2CD42-40D2-47A8-A6A2-3862B5F77661}"/>
+                <a16:creationId xmlns:a16="http://schemas.microsoft.com/office/drawing/2014/main" xmlns="" id="{1AE2CD42-40D2-47A8-A6A2-3862B5F77661}"/>
               </a:ext>
             </a:extLst>
           </p:cNvPr>
@@ -27382,7 +27611,7 @@
               <p:cNvPr id="3" name="Zástupný objekt pre obsah 2">
                 <a:extLst>
                   <a:ext uri="{FF2B5EF4-FFF2-40B4-BE49-F238E27FC236}">
-                    <a16:creationId xmlns:a16="http://schemas.microsoft.com/office/drawing/2014/main" id="{23538418-9779-4C4A-9AA5-1D5FF13E203C}"/>
+                    <a16:creationId xmlns:a16="http://schemas.microsoft.com/office/drawing/2014/main" xmlns="" id="{23538418-9779-4C4A-9AA5-1D5FF13E203C}"/>
                   </a:ext>
                 </a:extLst>
               </p:cNvPr>
@@ -29039,7 +29268,7 @@
           <p:cNvPr id="2" name="Nadpis 1">
             <a:extLst>
               <a:ext uri="{FF2B5EF4-FFF2-40B4-BE49-F238E27FC236}">
-                <a16:creationId xmlns:a16="http://schemas.microsoft.com/office/drawing/2014/main" id="{337A95AE-F640-4FEF-8241-CC249756D263}"/>
+                <a16:creationId xmlns:a16="http://schemas.microsoft.com/office/drawing/2014/main" xmlns="" id="{337A95AE-F640-4FEF-8241-CC249756D263}"/>
               </a:ext>
             </a:extLst>
           </p:cNvPr>
@@ -29076,7 +29305,7 @@
           <p:cNvPr id="3" name="Zástupný objekt pre obsah 2">
             <a:extLst>
               <a:ext uri="{FF2B5EF4-FFF2-40B4-BE49-F238E27FC236}">
-                <a16:creationId xmlns:a16="http://schemas.microsoft.com/office/drawing/2014/main" id="{6C6A7409-E2B5-4517-928C-D988207B36F3}"/>
+                <a16:creationId xmlns:a16="http://schemas.microsoft.com/office/drawing/2014/main" xmlns="" id="{6C6A7409-E2B5-4517-928C-D988207B36F3}"/>
               </a:ext>
             </a:extLst>
           </p:cNvPr>
@@ -29101,7 +29330,7 @@
           <p:cNvPr id="4" name="Obrázok 3">
             <a:extLst>
               <a:ext uri="{FF2B5EF4-FFF2-40B4-BE49-F238E27FC236}">
-                <a16:creationId xmlns:a16="http://schemas.microsoft.com/office/drawing/2014/main" id="{12BECBA8-9DD3-44C8-B60D-10DA0458F181}"/>
+                <a16:creationId xmlns:a16="http://schemas.microsoft.com/office/drawing/2014/main" xmlns="" id="{12BECBA8-9DD3-44C8-B60D-10DA0458F181}"/>
               </a:ext>
             </a:extLst>
           </p:cNvPr>
@@ -29161,7 +29390,7 @@
           <p:cNvPr id="2" name="Nadpis 1">
             <a:extLst>
               <a:ext uri="{FF2B5EF4-FFF2-40B4-BE49-F238E27FC236}">
-                <a16:creationId xmlns:a16="http://schemas.microsoft.com/office/drawing/2014/main" id="{CE809376-3FE3-45F6-8AB1-EF8ED28D7822}"/>
+                <a16:creationId xmlns:a16="http://schemas.microsoft.com/office/drawing/2014/main" xmlns="" id="{CE809376-3FE3-45F6-8AB1-EF8ED28D7822}"/>
               </a:ext>
             </a:extLst>
           </p:cNvPr>
@@ -29193,7 +29422,7 @@
           <p:cNvPr id="6" name="Zástupný objekt pre obsah 5">
             <a:extLst>
               <a:ext uri="{FF2B5EF4-FFF2-40B4-BE49-F238E27FC236}">
-                <a16:creationId xmlns:a16="http://schemas.microsoft.com/office/drawing/2014/main" id="{84575C49-1499-433D-9D69-0AB205A1AE7A}"/>
+                <a16:creationId xmlns:a16="http://schemas.microsoft.com/office/drawing/2014/main" xmlns="" id="{84575C49-1499-433D-9D69-0AB205A1AE7A}"/>
               </a:ext>
             </a:extLst>
           </p:cNvPr>
@@ -29264,7 +29493,7 @@
           <p:cNvPr id="7" name="Obrázok 6">
             <a:extLst>
               <a:ext uri="{FF2B5EF4-FFF2-40B4-BE49-F238E27FC236}">
-                <a16:creationId xmlns:a16="http://schemas.microsoft.com/office/drawing/2014/main" id="{7CFD0D68-6BAA-4791-A3C9-A29F8D6F6454}"/>
+                <a16:creationId xmlns:a16="http://schemas.microsoft.com/office/drawing/2014/main" xmlns="" id="{7CFD0D68-6BAA-4791-A3C9-A29F8D6F6454}"/>
               </a:ext>
             </a:extLst>
           </p:cNvPr>
@@ -29324,7 +29553,7 @@
           <p:cNvPr id="2" name="Nadpis 1">
             <a:extLst>
               <a:ext uri="{FF2B5EF4-FFF2-40B4-BE49-F238E27FC236}">
-                <a16:creationId xmlns:a16="http://schemas.microsoft.com/office/drawing/2014/main" id="{1B20204A-828E-4E11-9352-DAF59FF8B3CC}"/>
+                <a16:creationId xmlns:a16="http://schemas.microsoft.com/office/drawing/2014/main" xmlns="" id="{1B20204A-828E-4E11-9352-DAF59FF8B3CC}"/>
               </a:ext>
             </a:extLst>
           </p:cNvPr>
@@ -29356,7 +29585,7 @@
           <p:cNvPr id="3" name="Zástupný objekt pre obsah 2">
             <a:extLst>
               <a:ext uri="{FF2B5EF4-FFF2-40B4-BE49-F238E27FC236}">
-                <a16:creationId xmlns:a16="http://schemas.microsoft.com/office/drawing/2014/main" id="{64A30385-85A5-4970-9331-D53CE967D86A}"/>
+                <a16:creationId xmlns:a16="http://schemas.microsoft.com/office/drawing/2014/main" xmlns="" id="{64A30385-85A5-4970-9331-D53CE967D86A}"/>
               </a:ext>
             </a:extLst>
           </p:cNvPr>
@@ -29433,7 +29662,7 @@
           <p:cNvPr id="4" name="Obrázok 3">
             <a:extLst>
               <a:ext uri="{FF2B5EF4-FFF2-40B4-BE49-F238E27FC236}">
-                <a16:creationId xmlns:a16="http://schemas.microsoft.com/office/drawing/2014/main" id="{B8EEDB93-ED38-43BC-912B-10A5EA2E134D}"/>
+                <a16:creationId xmlns:a16="http://schemas.microsoft.com/office/drawing/2014/main" xmlns="" id="{B8EEDB93-ED38-43BC-912B-10A5EA2E134D}"/>
               </a:ext>
             </a:extLst>
           </p:cNvPr>
@@ -29493,7 +29722,7 @@
           <p:cNvPr id="2" name="Nadpis 1">
             <a:extLst>
               <a:ext uri="{FF2B5EF4-FFF2-40B4-BE49-F238E27FC236}">
-                <a16:creationId xmlns:a16="http://schemas.microsoft.com/office/drawing/2014/main" id="{025B5C93-5DB7-475A-A868-5B1CFFFFC0C7}"/>
+                <a16:creationId xmlns:a16="http://schemas.microsoft.com/office/drawing/2014/main" xmlns="" id="{025B5C93-5DB7-475A-A868-5B1CFFFFC0C7}"/>
               </a:ext>
             </a:extLst>
           </p:cNvPr>
@@ -29521,7 +29750,7 @@
           <p:cNvPr id="3" name="Zástupný objekt pre obsah 2">
             <a:extLst>
               <a:ext uri="{FF2B5EF4-FFF2-40B4-BE49-F238E27FC236}">
-                <a16:creationId xmlns:a16="http://schemas.microsoft.com/office/drawing/2014/main" id="{75684486-EE11-4F7B-874D-9E5B4EF62C39}"/>
+                <a16:creationId xmlns:a16="http://schemas.microsoft.com/office/drawing/2014/main" xmlns="" id="{75684486-EE11-4F7B-874D-9E5B4EF62C39}"/>
               </a:ext>
             </a:extLst>
           </p:cNvPr>
@@ -29641,7 +29870,7 @@
           <p:cNvPr id="5" name="Objekt 4">
             <a:extLst>
               <a:ext uri="{FF2B5EF4-FFF2-40B4-BE49-F238E27FC236}">
-                <a16:creationId xmlns:a16="http://schemas.microsoft.com/office/drawing/2014/main" id="{2CC5FF52-BB68-4084-9A71-ABAFC3C9FEF5}"/>
+                <a16:creationId xmlns:a16="http://schemas.microsoft.com/office/drawing/2014/main" xmlns="" id="{2CC5FF52-BB68-4084-9A71-ABAFC3C9FEF5}"/>
               </a:ext>
             </a:extLst>
           </p:cNvPr>
@@ -29664,7 +29893,7 @@
           <a:graphicData uri="http://schemas.openxmlformats.org/presentationml/2006/ole">
             <mc:AlternateContent xmlns:mc="http://schemas.openxmlformats.org/markup-compatibility/2006">
               <mc:Choice xmlns:v="urn:schemas-microsoft-com:vml" Requires="v">
-                <p:oleObj spid="_x0000_s2101" r:id="rId3" imgW="4876800" imgH="3533775" progId="CorelDraw.Graphic.7">
+                <p:oleObj spid="_x0000_s2105" r:id="rId3" imgW="4876800" imgH="3533775" progId="CorelDraw.Graphic.7">
                   <p:embed/>
                 </p:oleObj>
               </mc:Choice>
@@ -29716,7 +29945,7 @@
               <p:cNvPr id="6" name="Obdĺžnik 5">
                 <a:extLst>
                   <a:ext uri="{FF2B5EF4-FFF2-40B4-BE49-F238E27FC236}">
-                    <a16:creationId xmlns:a16="http://schemas.microsoft.com/office/drawing/2014/main" id="{6D351E0F-F052-4480-AF05-7DD8C7E61B8C}"/>
+                    <a16:creationId xmlns:a16="http://schemas.microsoft.com/office/drawing/2014/main" xmlns="" id="{6D351E0F-F052-4480-AF05-7DD8C7E61B8C}"/>
                   </a:ext>
                 </a:extLst>
               </p:cNvPr>
@@ -29893,7 +30122,7 @@
           <p:cNvPr id="7" name="Obdĺžnik 6">
             <a:extLst>
               <a:ext uri="{FF2B5EF4-FFF2-40B4-BE49-F238E27FC236}">
-                <a16:creationId xmlns:a16="http://schemas.microsoft.com/office/drawing/2014/main" id="{9BC6905F-0C46-4E14-9997-0E6D9384219B}"/>
+                <a16:creationId xmlns:a16="http://schemas.microsoft.com/office/drawing/2014/main" xmlns="" id="{9BC6905F-0C46-4E14-9997-0E6D9384219B}"/>
               </a:ext>
             </a:extLst>
           </p:cNvPr>
@@ -29956,7 +30185,7 @@
           <p:cNvPr id="8" name="Obdĺžnik 7">
             <a:extLst>
               <a:ext uri="{FF2B5EF4-FFF2-40B4-BE49-F238E27FC236}">
-                <a16:creationId xmlns:a16="http://schemas.microsoft.com/office/drawing/2014/main" id="{0FCB1309-A6EF-4565-A217-0F02ACCF7B69}"/>
+                <a16:creationId xmlns:a16="http://schemas.microsoft.com/office/drawing/2014/main" xmlns="" id="{0FCB1309-A6EF-4565-A217-0F02ACCF7B69}"/>
               </a:ext>
             </a:extLst>
           </p:cNvPr>
@@ -30367,7 +30596,7 @@
           <p:cNvPr id="2" name="Nadpis 1">
             <a:extLst>
               <a:ext uri="{FF2B5EF4-FFF2-40B4-BE49-F238E27FC236}">
-                <a16:creationId xmlns:a16="http://schemas.microsoft.com/office/drawing/2014/main" id="{34431D5F-13A7-4914-8CCC-E07D5DF6E426}"/>
+                <a16:creationId xmlns:a16="http://schemas.microsoft.com/office/drawing/2014/main" xmlns="" id="{34431D5F-13A7-4914-8CCC-E07D5DF6E426}"/>
               </a:ext>
             </a:extLst>
           </p:cNvPr>
@@ -30416,7 +30645,7 @@
           <p:cNvPr id="6" name="Zástupný objekt pre obsah 5">
             <a:extLst>
               <a:ext uri="{FF2B5EF4-FFF2-40B4-BE49-F238E27FC236}">
-                <a16:creationId xmlns:a16="http://schemas.microsoft.com/office/drawing/2014/main" id="{A431D58C-23CB-42B3-8B34-2B1729AA4F5E}"/>
+                <a16:creationId xmlns:a16="http://schemas.microsoft.com/office/drawing/2014/main" xmlns="" id="{A431D58C-23CB-42B3-8B34-2B1729AA4F5E}"/>
               </a:ext>
             </a:extLst>
           </p:cNvPr>
@@ -30525,7 +30754,7 @@
           <p:cNvPr id="7" name="Obrázok 6">
             <a:extLst>
               <a:ext uri="{FF2B5EF4-FFF2-40B4-BE49-F238E27FC236}">
-                <a16:creationId xmlns:a16="http://schemas.microsoft.com/office/drawing/2014/main" id="{636B88A2-5C1F-47F3-80DE-9A5DD17A26C2}"/>
+                <a16:creationId xmlns:a16="http://schemas.microsoft.com/office/drawing/2014/main" xmlns="" id="{636B88A2-5C1F-47F3-80DE-9A5DD17A26C2}"/>
               </a:ext>
             </a:extLst>
           </p:cNvPr>
@@ -30585,7 +30814,7 @@
           <p:cNvPr id="2" name="Nadpis 1">
             <a:extLst>
               <a:ext uri="{FF2B5EF4-FFF2-40B4-BE49-F238E27FC236}">
-                <a16:creationId xmlns:a16="http://schemas.microsoft.com/office/drawing/2014/main" id="{93307C90-3EB3-4BA0-AD7D-D7B210B48C06}"/>
+                <a16:creationId xmlns:a16="http://schemas.microsoft.com/office/drawing/2014/main" xmlns="" id="{93307C90-3EB3-4BA0-AD7D-D7B210B48C06}"/>
               </a:ext>
             </a:extLst>
           </p:cNvPr>
@@ -30622,7 +30851,7 @@
           <p:cNvPr id="3" name="Zástupný objekt pre obsah 2">
             <a:extLst>
               <a:ext uri="{FF2B5EF4-FFF2-40B4-BE49-F238E27FC236}">
-                <a16:creationId xmlns:a16="http://schemas.microsoft.com/office/drawing/2014/main" id="{9C57E4D7-0BE5-4689-85FD-7DCB1B58A5CC}"/>
+                <a16:creationId xmlns:a16="http://schemas.microsoft.com/office/drawing/2014/main" xmlns="" id="{9C57E4D7-0BE5-4689-85FD-7DCB1B58A5CC}"/>
               </a:ext>
             </a:extLst>
           </p:cNvPr>
@@ -30647,7 +30876,7 @@
           <p:cNvPr id="4" name="Obrázok 3">
             <a:extLst>
               <a:ext uri="{FF2B5EF4-FFF2-40B4-BE49-F238E27FC236}">
-                <a16:creationId xmlns:a16="http://schemas.microsoft.com/office/drawing/2014/main" id="{8873301D-7544-4BB6-8140-D7DF1029F77A}"/>
+                <a16:creationId xmlns:a16="http://schemas.microsoft.com/office/drawing/2014/main" xmlns="" id="{8873301D-7544-4BB6-8140-D7DF1029F77A}"/>
               </a:ext>
             </a:extLst>
           </p:cNvPr>
@@ -30707,7 +30936,7 @@
           <p:cNvPr id="2" name="Nadpis 1">
             <a:extLst>
               <a:ext uri="{FF2B5EF4-FFF2-40B4-BE49-F238E27FC236}">
-                <a16:creationId xmlns:a16="http://schemas.microsoft.com/office/drawing/2014/main" id="{F907E386-11DB-4896-AB00-60DF8F55B942}"/>
+                <a16:creationId xmlns:a16="http://schemas.microsoft.com/office/drawing/2014/main" xmlns="" id="{F907E386-11DB-4896-AB00-60DF8F55B942}"/>
               </a:ext>
             </a:extLst>
           </p:cNvPr>
@@ -30741,6 +30970,10 @@
               <a:rPr lang="en-GB" dirty="0"/>
               <a:t> Lag-Lead</a:t>
             </a:r>
+            <a:r>
+              <a:rPr lang="sk-SK" dirty="0"/>
+              <a:t/>
+            </a:r>
             <a:br>
               <a:rPr lang="sk-SK" dirty="0"/>
             </a:br>
@@ -30748,14 +30981,14 @@
           </a:p>
         </p:txBody>
       </p:sp>
-      <mc:AlternateContent xmlns:mc="http://schemas.openxmlformats.org/markup-compatibility/2006">
-        <mc:Choice xmlns:a14="http://schemas.microsoft.com/office/drawing/2010/main" Requires="a14">
+      <mc:AlternateContent xmlns:mc="http://schemas.openxmlformats.org/markup-compatibility/2006" xmlns:a14="http://schemas.microsoft.com/office/drawing/2010/main">
+        <mc:Choice Requires="a14">
           <p:sp>
             <p:nvSpPr>
               <p:cNvPr id="3" name="Zástupný objekt pre obsah 2">
                 <a:extLst>
                   <a:ext uri="{FF2B5EF4-FFF2-40B4-BE49-F238E27FC236}">
-                    <a16:creationId xmlns:a16="http://schemas.microsoft.com/office/drawing/2014/main" id="{BEAFDBB0-CE57-4D83-920F-7F5F521C22FA}"/>
+                    <a16:creationId xmlns:a16="http://schemas.microsoft.com/office/drawing/2014/main" xmlns="" id="{BEAFDBB0-CE57-4D83-920F-7F5F521C22FA}"/>
                   </a:ext>
                 </a:extLst>
               </p:cNvPr>
@@ -31269,7 +31502,7 @@
             </p:txBody>
           </p:sp>
         </mc:Choice>
-        <mc:Fallback>
+        <mc:Fallback xmlns="">
           <p:sp>
             <p:nvSpPr>
               <p:cNvPr id="3" name="Zástupný objekt pre obsah 2">
@@ -31344,7 +31577,7 @@
           <p:cNvPr id="2" name="Nadpis 1">
             <a:extLst>
               <a:ext uri="{FF2B5EF4-FFF2-40B4-BE49-F238E27FC236}">
-                <a16:creationId xmlns:a16="http://schemas.microsoft.com/office/drawing/2014/main" id="{2D46E49C-A4D3-49EF-93B7-E677FCAEA13A}"/>
+                <a16:creationId xmlns:a16="http://schemas.microsoft.com/office/drawing/2014/main" xmlns="" id="{2D46E49C-A4D3-49EF-93B7-E677FCAEA13A}"/>
               </a:ext>
             </a:extLst>
           </p:cNvPr>
@@ -31372,14 +31605,14 @@
           </a:p>
         </p:txBody>
       </p:sp>
-      <mc:AlternateContent xmlns:mc="http://schemas.openxmlformats.org/markup-compatibility/2006">
-        <mc:Choice xmlns:a14="http://schemas.microsoft.com/office/drawing/2010/main" Requires="a14">
+      <mc:AlternateContent xmlns:mc="http://schemas.openxmlformats.org/markup-compatibility/2006" xmlns:a14="http://schemas.microsoft.com/office/drawing/2010/main">
+        <mc:Choice Requires="a14">
           <p:sp>
             <p:nvSpPr>
               <p:cNvPr id="3" name="Zástupný objekt pre obsah 2">
                 <a:extLst>
                   <a:ext uri="{FF2B5EF4-FFF2-40B4-BE49-F238E27FC236}">
-                    <a16:creationId xmlns:a16="http://schemas.microsoft.com/office/drawing/2014/main" id="{96B1852F-5EC5-4D19-8E85-73A93A19B246}"/>
+                    <a16:creationId xmlns:a16="http://schemas.microsoft.com/office/drawing/2014/main" xmlns="" id="{96B1852F-5EC5-4D19-8E85-73A93A19B246}"/>
                   </a:ext>
                 </a:extLst>
               </p:cNvPr>
@@ -31734,7 +31967,7 @@
             </p:txBody>
           </p:sp>
         </mc:Choice>
-        <mc:Fallback>
+        <mc:Fallback xmlns="">
           <p:sp>
             <p:nvSpPr>
               <p:cNvPr id="3" name="Zástupný objekt pre obsah 2">
@@ -31783,7 +32016,7 @@
           <p:cNvPr id="4" name="Obrázok 3">
             <a:extLst>
               <a:ext uri="{FF2B5EF4-FFF2-40B4-BE49-F238E27FC236}">
-                <a16:creationId xmlns:a16="http://schemas.microsoft.com/office/drawing/2014/main" id="{E29E3A01-7C70-4557-8C92-54CA054B1CB3}"/>
+                <a16:creationId xmlns:a16="http://schemas.microsoft.com/office/drawing/2014/main" xmlns="" id="{E29E3A01-7C70-4557-8C92-54CA054B1CB3}"/>
               </a:ext>
             </a:extLst>
           </p:cNvPr>
@@ -31843,7 +32076,7 @@
           <p:cNvPr id="2" name="Nadpis 1">
             <a:extLst>
               <a:ext uri="{FF2B5EF4-FFF2-40B4-BE49-F238E27FC236}">
-                <a16:creationId xmlns:a16="http://schemas.microsoft.com/office/drawing/2014/main" id="{1AEE73CA-7F80-4390-A728-789FF3D5BBFF}"/>
+                <a16:creationId xmlns:a16="http://schemas.microsoft.com/office/drawing/2014/main" xmlns="" id="{1AEE73CA-7F80-4390-A728-789FF3D5BBFF}"/>
               </a:ext>
             </a:extLst>
           </p:cNvPr>
@@ -31876,7 +32109,7 @@
           <p:cNvPr id="3" name="Zástupný objekt pre obsah 2">
             <a:extLst>
               <a:ext uri="{FF2B5EF4-FFF2-40B4-BE49-F238E27FC236}">
-                <a16:creationId xmlns:a16="http://schemas.microsoft.com/office/drawing/2014/main" id="{711E597C-DD28-4410-96C4-E2DEEAAE55A1}"/>
+                <a16:creationId xmlns:a16="http://schemas.microsoft.com/office/drawing/2014/main" xmlns="" id="{711E597C-DD28-4410-96C4-E2DEEAAE55A1}"/>
               </a:ext>
             </a:extLst>
           </p:cNvPr>
@@ -31901,7 +32134,7 @@
           <p:cNvPr id="5" name="Obrázok 4">
             <a:extLst>
               <a:ext uri="{FF2B5EF4-FFF2-40B4-BE49-F238E27FC236}">
-                <a16:creationId xmlns:a16="http://schemas.microsoft.com/office/drawing/2014/main" id="{2C32D18D-58E7-499E-B544-2AF28D0CCB59}"/>
+                <a16:creationId xmlns:a16="http://schemas.microsoft.com/office/drawing/2014/main" xmlns="" id="{2C32D18D-58E7-499E-B544-2AF28D0CCB59}"/>
               </a:ext>
             </a:extLst>
           </p:cNvPr>
@@ -31961,7 +32194,7 @@
           <p:cNvPr id="2" name="Nadpis 1">
             <a:extLst>
               <a:ext uri="{FF2B5EF4-FFF2-40B4-BE49-F238E27FC236}">
-                <a16:creationId xmlns:a16="http://schemas.microsoft.com/office/drawing/2014/main" id="{4071B2F1-4BE6-4C74-9F07-0C0891E42C85}"/>
+                <a16:creationId xmlns:a16="http://schemas.microsoft.com/office/drawing/2014/main" xmlns="" id="{4071B2F1-4BE6-4C74-9F07-0C0891E42C85}"/>
               </a:ext>
             </a:extLst>
           </p:cNvPr>
@@ -31989,14 +32222,14 @@
           </a:p>
         </p:txBody>
       </p:sp>
-      <mc:AlternateContent xmlns:mc="http://schemas.openxmlformats.org/markup-compatibility/2006">
-        <mc:Choice xmlns:a14="http://schemas.microsoft.com/office/drawing/2010/main" Requires="a14">
+      <mc:AlternateContent xmlns:mc="http://schemas.openxmlformats.org/markup-compatibility/2006" xmlns:a14="http://schemas.microsoft.com/office/drawing/2010/main">
+        <mc:Choice Requires="a14">
           <p:sp>
             <p:nvSpPr>
               <p:cNvPr id="3" name="Zástupný objekt pre obsah 2">
                 <a:extLst>
                   <a:ext uri="{FF2B5EF4-FFF2-40B4-BE49-F238E27FC236}">
-                    <a16:creationId xmlns:a16="http://schemas.microsoft.com/office/drawing/2014/main" id="{5179D0E4-9367-47C6-963B-531998BFF45C}"/>
+                    <a16:creationId xmlns:a16="http://schemas.microsoft.com/office/drawing/2014/main" xmlns="" id="{5179D0E4-9367-47C6-963B-531998BFF45C}"/>
                   </a:ext>
                 </a:extLst>
               </p:cNvPr>
@@ -32693,7 +32926,7 @@
             </p:txBody>
           </p:sp>
         </mc:Choice>
-        <mc:Fallback>
+        <mc:Fallback xmlns="">
           <p:sp>
             <p:nvSpPr>
               <p:cNvPr id="3" name="Zástupný objekt pre obsah 2">
@@ -32738,7 +32971,7 @@
           <p:cNvPr id="4" name="Obrázok 3">
             <a:extLst>
               <a:ext uri="{FF2B5EF4-FFF2-40B4-BE49-F238E27FC236}">
-                <a16:creationId xmlns:a16="http://schemas.microsoft.com/office/drawing/2014/main" id="{BA61AB89-DB12-4A43-8ED8-AEE2D381C2F7}"/>
+                <a16:creationId xmlns:a16="http://schemas.microsoft.com/office/drawing/2014/main" xmlns="" id="{BA61AB89-DB12-4A43-8ED8-AEE2D381C2F7}"/>
               </a:ext>
             </a:extLst>
           </p:cNvPr>
@@ -32798,7 +33031,7 @@
           <p:cNvPr id="2" name="Nadpis 1">
             <a:extLst>
               <a:ext uri="{FF2B5EF4-FFF2-40B4-BE49-F238E27FC236}">
-                <a16:creationId xmlns:a16="http://schemas.microsoft.com/office/drawing/2014/main" id="{18830640-1EB8-4FCC-8DF2-7061DDCBA075}"/>
+                <a16:creationId xmlns:a16="http://schemas.microsoft.com/office/drawing/2014/main" xmlns="" id="{18830640-1EB8-4FCC-8DF2-7061DDCBA075}"/>
               </a:ext>
             </a:extLst>
           </p:cNvPr>
@@ -32826,14 +33059,14 @@
           </a:p>
         </p:txBody>
       </p:sp>
-      <mc:AlternateContent xmlns:mc="http://schemas.openxmlformats.org/markup-compatibility/2006">
-        <mc:Choice xmlns:a14="http://schemas.microsoft.com/office/drawing/2010/main" Requires="a14">
+      <mc:AlternateContent xmlns:mc="http://schemas.openxmlformats.org/markup-compatibility/2006" xmlns:a14="http://schemas.microsoft.com/office/drawing/2010/main">
+        <mc:Choice Requires="a14">
           <p:sp>
             <p:nvSpPr>
               <p:cNvPr id="3" name="Zástupný objekt pre obsah 2">
                 <a:extLst>
                   <a:ext uri="{FF2B5EF4-FFF2-40B4-BE49-F238E27FC236}">
-                    <a16:creationId xmlns:a16="http://schemas.microsoft.com/office/drawing/2014/main" id="{73A5BF1F-AECF-4CFC-9ACD-33AD0D89D6DB}"/>
+                    <a16:creationId xmlns:a16="http://schemas.microsoft.com/office/drawing/2014/main" xmlns="" id="{73A5BF1F-AECF-4CFC-9ACD-33AD0D89D6DB}"/>
                   </a:ext>
                 </a:extLst>
               </p:cNvPr>
@@ -33349,16 +33582,7 @@
                         </a:solidFill>
                         <a:latin typeface="Cambria Math" panose="02040503050406030204" pitchFamily="18" charset="0"/>
                       </a:rPr>
-                      <m:t>=</m:t>
-                    </m:r>
-                    <m:r>
-                      <a:rPr lang="en-US" i="1">
-                        <a:solidFill>
-                          <a:srgbClr val="FF0000"/>
-                        </a:solidFill>
-                        <a:latin typeface="Cambria Math" panose="02040503050406030204" pitchFamily="18" charset="0"/>
-                      </a:rPr>
-                      <m:t>0.0617</m:t>
+                      <m:t>=0.0617</m:t>
                     </m:r>
                   </m:oMath>
                 </a14:m>
@@ -34386,7 +34610,7 @@
             </p:txBody>
           </p:sp>
         </mc:Choice>
-        <mc:Fallback>
+        <mc:Fallback xmlns="">
           <p:sp>
             <p:nvSpPr>
               <p:cNvPr id="3" name="Zástupný objekt pre obsah 2">
@@ -34461,7 +34685,7 @@
           <p:cNvPr id="2" name="Nadpis 1">
             <a:extLst>
               <a:ext uri="{FF2B5EF4-FFF2-40B4-BE49-F238E27FC236}">
-                <a16:creationId xmlns:a16="http://schemas.microsoft.com/office/drawing/2014/main" id="{42298BF5-1EF3-4109-A24F-427C8877E887}"/>
+                <a16:creationId xmlns:a16="http://schemas.microsoft.com/office/drawing/2014/main" xmlns="" id="{42298BF5-1EF3-4109-A24F-427C8877E887}"/>
               </a:ext>
             </a:extLst>
           </p:cNvPr>
@@ -34494,7 +34718,7 @@
           <p:cNvPr id="3" name="Zástupný objekt pre obsah 2">
             <a:extLst>
               <a:ext uri="{FF2B5EF4-FFF2-40B4-BE49-F238E27FC236}">
-                <a16:creationId xmlns:a16="http://schemas.microsoft.com/office/drawing/2014/main" id="{E019704E-EFAB-41A0-9236-3F7563F5A6B1}"/>
+                <a16:creationId xmlns:a16="http://schemas.microsoft.com/office/drawing/2014/main" xmlns="" id="{E019704E-EFAB-41A0-9236-3F7563F5A6B1}"/>
               </a:ext>
             </a:extLst>
           </p:cNvPr>
@@ -34519,7 +34743,7 @@
           <p:cNvPr id="4" name="Obrázok 3">
             <a:extLst>
               <a:ext uri="{FF2B5EF4-FFF2-40B4-BE49-F238E27FC236}">
-                <a16:creationId xmlns:a16="http://schemas.microsoft.com/office/drawing/2014/main" id="{8B213391-4CE3-41BA-943E-763F0315956A}"/>
+                <a16:creationId xmlns:a16="http://schemas.microsoft.com/office/drawing/2014/main" xmlns="" id="{8B213391-4CE3-41BA-943E-763F0315956A}"/>
               </a:ext>
             </a:extLst>
           </p:cNvPr>
@@ -34579,7 +34803,7 @@
           <p:cNvPr id="2" name="Nadpis 1">
             <a:extLst>
               <a:ext uri="{FF2B5EF4-FFF2-40B4-BE49-F238E27FC236}">
-                <a16:creationId xmlns:a16="http://schemas.microsoft.com/office/drawing/2014/main" id="{488AFAF5-3BA3-4BE2-804B-FFB7DB80E512}"/>
+                <a16:creationId xmlns:a16="http://schemas.microsoft.com/office/drawing/2014/main" xmlns="" id="{488AFAF5-3BA3-4BE2-804B-FFB7DB80E512}"/>
               </a:ext>
             </a:extLst>
           </p:cNvPr>
@@ -34612,7 +34836,7 @@
           <p:cNvPr id="3" name="Zástupný objekt pre obsah 2">
             <a:extLst>
               <a:ext uri="{FF2B5EF4-FFF2-40B4-BE49-F238E27FC236}">
-                <a16:creationId xmlns:a16="http://schemas.microsoft.com/office/drawing/2014/main" id="{FD1DCF89-3F97-4629-B3CF-1191118235AA}"/>
+                <a16:creationId xmlns:a16="http://schemas.microsoft.com/office/drawing/2014/main" xmlns="" id="{FD1DCF89-3F97-4629-B3CF-1191118235AA}"/>
               </a:ext>
             </a:extLst>
           </p:cNvPr>
@@ -34637,7 +34861,7 @@
           <p:cNvPr id="4" name="Obrázok 3">
             <a:extLst>
               <a:ext uri="{FF2B5EF4-FFF2-40B4-BE49-F238E27FC236}">
-                <a16:creationId xmlns:a16="http://schemas.microsoft.com/office/drawing/2014/main" id="{CB5E7143-4B12-4A20-89AA-27662CDCCEDE}"/>
+                <a16:creationId xmlns:a16="http://schemas.microsoft.com/office/drawing/2014/main" xmlns="" id="{CB5E7143-4B12-4A20-89AA-27662CDCCEDE}"/>
               </a:ext>
             </a:extLst>
           </p:cNvPr>
@@ -34697,7 +34921,7 @@
           <p:cNvPr id="2" name="Nadpis 1">
             <a:extLst>
               <a:ext uri="{FF2B5EF4-FFF2-40B4-BE49-F238E27FC236}">
-                <a16:creationId xmlns:a16="http://schemas.microsoft.com/office/drawing/2014/main" id="{2B0982E4-127E-411B-B444-B5769CB74EC6}"/>
+                <a16:creationId xmlns:a16="http://schemas.microsoft.com/office/drawing/2014/main" xmlns="" id="{2B0982E4-127E-411B-B444-B5769CB74EC6}"/>
               </a:ext>
             </a:extLst>
           </p:cNvPr>
@@ -34730,7 +34954,7 @@
           <p:cNvPr id="4" name="Zástupný objekt pre obsah 3">
             <a:extLst>
               <a:ext uri="{FF2B5EF4-FFF2-40B4-BE49-F238E27FC236}">
-                <a16:creationId xmlns:a16="http://schemas.microsoft.com/office/drawing/2014/main" id="{902A5F49-6360-40F5-88B7-EE0CFD13A2EE}"/>
+                <a16:creationId xmlns:a16="http://schemas.microsoft.com/office/drawing/2014/main" xmlns="" id="{902A5F49-6360-40F5-88B7-EE0CFD13A2EE}"/>
               </a:ext>
             </a:extLst>
           </p:cNvPr>
@@ -34762,7 +34986,7 @@
           <p:cNvPr id="5" name="Obdĺžnik 4">
             <a:extLst>
               <a:ext uri="{FF2B5EF4-FFF2-40B4-BE49-F238E27FC236}">
-                <a16:creationId xmlns:a16="http://schemas.microsoft.com/office/drawing/2014/main" id="{D503A7D0-9A86-4B89-B2F3-9CEDCF56B623}"/>
+                <a16:creationId xmlns:a16="http://schemas.microsoft.com/office/drawing/2014/main" xmlns="" id="{D503A7D0-9A86-4B89-B2F3-9CEDCF56B623}"/>
               </a:ext>
             </a:extLst>
           </p:cNvPr>
@@ -34887,7 +35111,7 @@
           <p:cNvPr id="2" name="Nadpis 1">
             <a:extLst>
               <a:ext uri="{FF2B5EF4-FFF2-40B4-BE49-F238E27FC236}">
-                <a16:creationId xmlns:a16="http://schemas.microsoft.com/office/drawing/2014/main" id="{4D0453B4-6BB5-40A9-AE59-A3B7AECAAFBC}"/>
+                <a16:creationId xmlns:a16="http://schemas.microsoft.com/office/drawing/2014/main" xmlns="" id="{4D0453B4-6BB5-40A9-AE59-A3B7AECAAFBC}"/>
               </a:ext>
             </a:extLst>
           </p:cNvPr>
@@ -34915,7 +35139,7 @@
           <p:cNvPr id="4" name="Zástupný objekt pre obsah 3">
             <a:extLst>
               <a:ext uri="{FF2B5EF4-FFF2-40B4-BE49-F238E27FC236}">
-                <a16:creationId xmlns:a16="http://schemas.microsoft.com/office/drawing/2014/main" id="{70B0F86E-9A76-44EE-842F-787E08D2F0F6}"/>
+                <a16:creationId xmlns:a16="http://schemas.microsoft.com/office/drawing/2014/main" xmlns="" id="{70B0F86E-9A76-44EE-842F-787E08D2F0F6}"/>
               </a:ext>
             </a:extLst>
           </p:cNvPr>
@@ -34997,7 +35221,7 @@
           <p:cNvPr id="7" name="Rectangle 7">
             <a:extLst>
               <a:ext uri="{FF2B5EF4-FFF2-40B4-BE49-F238E27FC236}">
-                <a16:creationId xmlns:a16="http://schemas.microsoft.com/office/drawing/2014/main" id="{B48F46DA-2366-4B99-9BDC-9676BC919DD8}"/>
+                <a16:creationId xmlns:a16="http://schemas.microsoft.com/office/drawing/2014/main" xmlns="" id="{B48F46DA-2366-4B99-9BDC-9676BC919DD8}"/>
               </a:ext>
             </a:extLst>
           </p:cNvPr>
@@ -35107,7 +35331,7 @@
           <p:cNvPr id="8" name="Objekt 7">
             <a:extLst>
               <a:ext uri="{FF2B5EF4-FFF2-40B4-BE49-F238E27FC236}">
-                <a16:creationId xmlns:a16="http://schemas.microsoft.com/office/drawing/2014/main" id="{A214DBED-5B68-4663-B935-C7C4A39E50A8}"/>
+                <a16:creationId xmlns:a16="http://schemas.microsoft.com/office/drawing/2014/main" xmlns="" id="{A214DBED-5B68-4663-B935-C7C4A39E50A8}"/>
               </a:ext>
             </a:extLst>
           </p:cNvPr>
@@ -35130,7 +35354,7 @@
           <a:graphicData uri="http://schemas.openxmlformats.org/presentationml/2006/ole">
             <mc:AlternateContent xmlns:mc="http://schemas.openxmlformats.org/markup-compatibility/2006">
               <mc:Choice xmlns:v="urn:schemas-microsoft-com:vml" Requires="v">
-                <p:oleObj spid="_x0000_s3216" r:id="rId3" imgW="5059680" imgH="3770376" progId="CorelDraw.Graphic.7">
+                <p:oleObj spid="_x0000_s3228" r:id="rId3" imgW="5059680" imgH="3770376" progId="CorelDraw.Graphic.7">
                   <p:embed/>
                 </p:oleObj>
               </mc:Choice>
@@ -35180,7 +35404,7 @@
           <p:cNvPr id="9" name="Obdĺžnik 8">
             <a:extLst>
               <a:ext uri="{FF2B5EF4-FFF2-40B4-BE49-F238E27FC236}">
-                <a16:creationId xmlns:a16="http://schemas.microsoft.com/office/drawing/2014/main" id="{8FB412A7-B3E1-4764-AE81-12C318FBB470}"/>
+                <a16:creationId xmlns:a16="http://schemas.microsoft.com/office/drawing/2014/main" xmlns="" id="{8FB412A7-B3E1-4764-AE81-12C318FBB470}"/>
               </a:ext>
             </a:extLst>
           </p:cNvPr>
@@ -35228,7 +35452,7 @@
           <p:cNvPr id="10" name="Objekt 9">
             <a:extLst>
               <a:ext uri="{FF2B5EF4-FFF2-40B4-BE49-F238E27FC236}">
-                <a16:creationId xmlns:a16="http://schemas.microsoft.com/office/drawing/2014/main" id="{C3F9C31D-7173-4718-9DC3-8C41F320892A}"/>
+                <a16:creationId xmlns:a16="http://schemas.microsoft.com/office/drawing/2014/main" xmlns="" id="{C3F9C31D-7173-4718-9DC3-8C41F320892A}"/>
               </a:ext>
             </a:extLst>
           </p:cNvPr>
@@ -35251,7 +35475,7 @@
           <a:graphicData uri="http://schemas.openxmlformats.org/presentationml/2006/ole">
             <mc:AlternateContent xmlns:mc="http://schemas.openxmlformats.org/markup-compatibility/2006">
               <mc:Choice xmlns:v="urn:schemas-microsoft-com:vml" Requires="v">
-                <p:oleObj spid="_x0000_s3217" name="Rovnica" r:id="rId5" imgW="990360" imgH="304560" progId="Equation.3">
+                <p:oleObj spid="_x0000_s3229" name="Rovnica" r:id="rId5" imgW="990360" imgH="304560" progId="Equation.3">
                   <p:embed/>
                 </p:oleObj>
               </mc:Choice>
@@ -35317,7 +35541,7 @@
           <p:cNvPr id="11" name="Rectangle 7">
             <a:extLst>
               <a:ext uri="{FF2B5EF4-FFF2-40B4-BE49-F238E27FC236}">
-                <a16:creationId xmlns:a16="http://schemas.microsoft.com/office/drawing/2014/main" id="{1BF6AE44-7A35-4924-9976-510095E75B7B}"/>
+                <a16:creationId xmlns:a16="http://schemas.microsoft.com/office/drawing/2014/main" xmlns="" id="{1BF6AE44-7A35-4924-9976-510095E75B7B}"/>
               </a:ext>
             </a:extLst>
           </p:cNvPr>
@@ -35427,7 +35651,7 @@
           <p:cNvPr id="12" name="Objekt 11">
             <a:extLst>
               <a:ext uri="{FF2B5EF4-FFF2-40B4-BE49-F238E27FC236}">
-                <a16:creationId xmlns:a16="http://schemas.microsoft.com/office/drawing/2014/main" id="{38BB830D-71D6-4F3F-88D8-B62E1E926775}"/>
+                <a16:creationId xmlns:a16="http://schemas.microsoft.com/office/drawing/2014/main" xmlns="" id="{38BB830D-71D6-4F3F-88D8-B62E1E926775}"/>
               </a:ext>
             </a:extLst>
           </p:cNvPr>
@@ -35450,7 +35674,7 @@
           <a:graphicData uri="http://schemas.openxmlformats.org/presentationml/2006/ole">
             <mc:AlternateContent xmlns:mc="http://schemas.openxmlformats.org/markup-compatibility/2006">
               <mc:Choice xmlns:v="urn:schemas-microsoft-com:vml" Requires="v">
-                <p:oleObj spid="_x0000_s3218" name="Rovnica" r:id="rId7" imgW="1155600" imgH="304560" progId="Equation.3">
+                <p:oleObj spid="_x0000_s3230" name="Rovnica" r:id="rId7" imgW="1155600" imgH="304560" progId="Equation.3">
                   <p:embed/>
                 </p:oleObj>
               </mc:Choice>
@@ -35516,7 +35740,7 @@
           <p:cNvPr id="14" name="Rectangle 13">
             <a:extLst>
               <a:ext uri="{FF2B5EF4-FFF2-40B4-BE49-F238E27FC236}">
-                <a16:creationId xmlns:a16="http://schemas.microsoft.com/office/drawing/2014/main" id="{8C9470B9-B2A5-4762-ADF6-9ED6B71228CE}"/>
+                <a16:creationId xmlns:a16="http://schemas.microsoft.com/office/drawing/2014/main" xmlns="" id="{8C9470B9-B2A5-4762-ADF6-9ED6B71228CE}"/>
               </a:ext>
             </a:extLst>
           </p:cNvPr>
@@ -35990,7 +36214,7 @@
               <p:cNvPr id="15" name="Obdĺžnik 14">
                 <a:extLst>
                   <a:ext uri="{FF2B5EF4-FFF2-40B4-BE49-F238E27FC236}">
-                    <a16:creationId xmlns:a16="http://schemas.microsoft.com/office/drawing/2014/main" id="{D8AA12A4-55FD-45E2-B521-7C0CB2D8557B}"/>
+                    <a16:creationId xmlns:a16="http://schemas.microsoft.com/office/drawing/2014/main" xmlns="" id="{D8AA12A4-55FD-45E2-B521-7C0CB2D8557B}"/>
                   </a:ext>
                 </a:extLst>
               </p:cNvPr>
@@ -36173,7 +36397,7 @@
           <p:cNvPr id="16" name="Rectangle 13">
             <a:extLst>
               <a:ext uri="{FF2B5EF4-FFF2-40B4-BE49-F238E27FC236}">
-                <a16:creationId xmlns:a16="http://schemas.microsoft.com/office/drawing/2014/main" id="{C3BA664C-1BD4-4AA9-9004-6587B2B4BB8C}"/>
+                <a16:creationId xmlns:a16="http://schemas.microsoft.com/office/drawing/2014/main" xmlns="" id="{C3BA664C-1BD4-4AA9-9004-6587B2B4BB8C}"/>
               </a:ext>
             </a:extLst>
           </p:cNvPr>
@@ -36184,8 +36408,8 @@
         </p:nvSpPr>
         <p:spPr bwMode="auto">
           <a:xfrm rot="10800000" flipV="1">
-            <a:off x="7693801" y="5818187"/>
-            <a:ext cx="3225062" cy="646331"/>
+            <a:off x="7391798" y="6032079"/>
+            <a:ext cx="1752202" cy="738664"/>
           </a:xfrm>
           <a:prstGeom prst="rect">
             <a:avLst/>
@@ -36405,19 +36629,19 @@
               </a:tabLst>
             </a:pPr>
             <a:r>
-              <a:rPr lang="en-US" altLang="sk-SK" sz="1200" dirty="0">
+              <a:rPr lang="en-US" altLang="sk-SK" sz="1400" b="1" dirty="0">
                 <a:latin typeface="+mj-lt"/>
               </a:rPr>
               <a:t>n=r</a:t>
             </a:r>
             <a:r>
-              <a:rPr lang="sk-SK" altLang="sk-SK" sz="1200" dirty="0" err="1">
+              <a:rPr lang="sk-SK" altLang="sk-SK" sz="1400" b="1" dirty="0" err="1">
                 <a:latin typeface="+mj-lt"/>
               </a:rPr>
               <a:t>ád</a:t>
             </a:r>
             <a:r>
-              <a:rPr lang="sk-SK" altLang="sk-SK" sz="1200" dirty="0">
+              <a:rPr lang="sk-SK" altLang="sk-SK" sz="1400" b="1" dirty="0">
                 <a:latin typeface="+mj-lt"/>
               </a:rPr>
               <a:t> čitateľa</a:t>
@@ -36445,7 +36669,7 @@
               </a:tabLst>
             </a:pPr>
             <a:r>
-              <a:rPr lang="sk-SK" altLang="sk-SK" sz="1200" dirty="0">
+              <a:rPr lang="sk-SK" altLang="sk-SK" sz="1400" b="1" dirty="0">
                 <a:latin typeface="+mj-lt"/>
               </a:rPr>
               <a:t>(koľkými kvadrantami</a:t>
@@ -36473,12 +36697,12 @@
               </a:tabLst>
             </a:pPr>
             <a:r>
-              <a:rPr lang="sk-SK" altLang="sk-SK" sz="1200" dirty="0">
+              <a:rPr lang="sk-SK" altLang="sk-SK" sz="1400" b="1" dirty="0">
                 <a:latin typeface="+mj-lt"/>
               </a:rPr>
               <a:t>prechádza) </a:t>
             </a:r>
-            <a:endParaRPr kumimoji="0" lang="sk-SK" altLang="sk-SK" sz="1200" b="0" i="0" u="none" strike="noStrike" cap="none" normalizeH="0" baseline="0" dirty="0">
+            <a:endParaRPr kumimoji="0" lang="sk-SK" altLang="sk-SK" sz="1400" b="1" i="0" u="none" strike="noStrike" cap="none" normalizeH="0" baseline="0" dirty="0">
               <a:ln>
                 <a:noFill/>
               </a:ln>
@@ -36487,7 +36711,6 @@
               </a:solidFill>
               <a:effectLst/>
               <a:latin typeface="+mj-lt"/>
-              <a:cs typeface="Arial" pitchFamily="34" charset="0"/>
             </a:endParaRPr>
           </a:p>
         </p:txBody>
@@ -36696,7 +36919,7 @@
           <p:cNvPr id="2" name="Nadpis 1">
             <a:extLst>
               <a:ext uri="{FF2B5EF4-FFF2-40B4-BE49-F238E27FC236}">
-                <a16:creationId xmlns:a16="http://schemas.microsoft.com/office/drawing/2014/main" id="{4D0453B4-6BB5-40A9-AE59-A3B7AECAAFBC}"/>
+                <a16:creationId xmlns:a16="http://schemas.microsoft.com/office/drawing/2014/main" xmlns="" id="{4D0453B4-6BB5-40A9-AE59-A3B7AECAAFBC}"/>
               </a:ext>
             </a:extLst>
           </p:cNvPr>
@@ -36719,14 +36942,14 @@
           </a:p>
         </p:txBody>
       </p:sp>
-      <mc:AlternateContent xmlns:mc="http://schemas.openxmlformats.org/markup-compatibility/2006" xmlns:a14="http://schemas.microsoft.com/office/drawing/2010/main">
-        <mc:Choice Requires="a14">
+      <mc:AlternateContent xmlns:mc="http://schemas.openxmlformats.org/markup-compatibility/2006">
+        <mc:Choice xmlns:a14="http://schemas.microsoft.com/office/drawing/2010/main" Requires="a14">
           <p:sp>
             <p:nvSpPr>
               <p:cNvPr id="3" name="Zástupný objekt pre obsah 2">
                 <a:extLst>
                   <a:ext uri="{FF2B5EF4-FFF2-40B4-BE49-F238E27FC236}">
-                    <a16:creationId xmlns:a16="http://schemas.microsoft.com/office/drawing/2014/main" id="{66B470C3-495B-4457-BC19-B82774A72683}"/>
+                    <a16:creationId xmlns:a16="http://schemas.microsoft.com/office/drawing/2014/main" xmlns="" id="{66B470C3-495B-4457-BC19-B82774A72683}"/>
                   </a:ext>
                 </a:extLst>
               </p:cNvPr>
@@ -36760,8 +36983,47 @@
                       <a:schemeClr val="tx1"/>
                     </a:solidFill>
                   </a:rPr>
-                  <a:t>– korekčné členy budeme zapájať do obvodu sériovo</a:t>
-                </a:r>
+                  <a:t>– korekčné členy budeme zapájať do obvodu </a:t>
+                </a:r>
+                <a:r>
+                  <a:rPr lang="sk-SK" sz="1800" dirty="0" smtClean="0">
+                    <a:solidFill>
+                      <a:schemeClr val="tx1"/>
+                    </a:solidFill>
+                  </a:rPr>
+                  <a:t>sériovo – pred </a:t>
+                </a:r>
+                <a:r>
+                  <a:rPr lang="sk-SK" sz="1800" dirty="0">
+                    <a:solidFill>
+                      <a:schemeClr val="tx1"/>
+                    </a:solidFill>
+                  </a:rPr>
+                  <a:t>r</a:t>
+                </a:r>
+                <a:r>
+                  <a:rPr lang="sk-SK" sz="1800" dirty="0" smtClean="0">
+                    <a:solidFill>
+                      <a:schemeClr val="tx1"/>
+                    </a:solidFill>
+                  </a:rPr>
+                  <a:t>iadený systém</a:t>
+                </a:r>
+              </a:p>
+              <a:p>
+                <a:r>
+                  <a:rPr lang="sk-SK" sz="1800" dirty="0" smtClean="0">
+                    <a:solidFill>
+                      <a:schemeClr val="tx1"/>
+                    </a:solidFill>
+                  </a:rPr>
+                  <a:t>- korekčné členy  sú alternatívnym prístupom k PID regulátorom v riadení systémov</a:t>
+                </a:r>
+                <a:endParaRPr lang="sk-SK" sz="1800" dirty="0">
+                  <a:solidFill>
+                    <a:schemeClr val="tx1"/>
+                  </a:solidFill>
+                </a:endParaRPr>
               </a:p>
               <a:p>
                 <a:endParaRPr lang="sk-SK" sz="1800" dirty="0">
@@ -37080,13 +37342,13 @@
             </p:txBody>
           </p:sp>
         </mc:Choice>
-        <mc:Fallback xmlns="">
+        <mc:Fallback>
           <p:sp>
             <p:nvSpPr>
               <p:cNvPr id="3" name="Zástupný objekt pre obsah 2">
                 <a:extLst>
                   <a:ext uri="{FF2B5EF4-FFF2-40B4-BE49-F238E27FC236}">
-                    <a16:creationId xmlns:a16="http://schemas.microsoft.com/office/drawing/2014/main" id="{66B470C3-495B-4457-BC19-B82774A72683}"/>
+                    <a16:creationId xmlns:a16="http://schemas.microsoft.com/office/drawing/2014/main" xmlns:a14="http://schemas.microsoft.com/office/drawing/2010/main" xmlns="" id="{66B470C3-495B-4457-BC19-B82774A72683}"/>
                   </a:ext>
                 </a:extLst>
               </p:cNvPr>
@@ -37098,7 +37360,7 @@
               </p:nvPr>
             </p:nvSpPr>
             <p:spPr>
-              <a:blipFill>
+              <a:blipFill rotWithShape="0">
                 <a:blip r:embed="rId2"/>
                 <a:stretch>
                   <a:fillRect l="-657" t="-1174"/>
@@ -37125,7 +37387,7 @@
           <p:cNvPr id="15" name="Obrázok 14">
             <a:extLst>
               <a:ext uri="{FF2B5EF4-FFF2-40B4-BE49-F238E27FC236}">
-                <a16:creationId xmlns:a16="http://schemas.microsoft.com/office/drawing/2014/main" id="{C6F7513E-4165-455E-8478-F46FAD95AFE9}"/>
+                <a16:creationId xmlns:a16="http://schemas.microsoft.com/office/drawing/2014/main" xmlns="" id="{C6F7513E-4165-455E-8478-F46FAD95AFE9}"/>
               </a:ext>
             </a:extLst>
           </p:cNvPr>
@@ -37142,7 +37404,7 @@
         </p:blipFill>
         <p:spPr>
           <a:xfrm>
-            <a:off x="1602105" y="1959102"/>
+            <a:off x="1888780" y="2445135"/>
             <a:ext cx="5695950" cy="1257300"/>
           </a:xfrm>
           <a:prstGeom prst="rect">
@@ -37260,7 +37522,7 @@
           <p:cNvPr id="2" name="Nadpis 1">
             <a:extLst>
               <a:ext uri="{FF2B5EF4-FFF2-40B4-BE49-F238E27FC236}">
-                <a16:creationId xmlns:a16="http://schemas.microsoft.com/office/drawing/2014/main" id="{5DAF6CEF-1A94-4383-BA33-A865F973BED8}"/>
+                <a16:creationId xmlns:a16="http://schemas.microsoft.com/office/drawing/2014/main" xmlns="" id="{5DAF6CEF-1A94-4383-BA33-A865F973BED8}"/>
               </a:ext>
             </a:extLst>
           </p:cNvPr>
@@ -37290,7 +37552,7 @@
           <p:cNvPr id="3" name="Zástupný objekt pre obsah 2">
             <a:extLst>
               <a:ext uri="{FF2B5EF4-FFF2-40B4-BE49-F238E27FC236}">
-                <a16:creationId xmlns:a16="http://schemas.microsoft.com/office/drawing/2014/main" id="{2FB1C415-06C1-4F12-987A-4B53F0A351C8}"/>
+                <a16:creationId xmlns:a16="http://schemas.microsoft.com/office/drawing/2014/main" xmlns="" id="{2FB1C415-06C1-4F12-987A-4B53F0A351C8}"/>
               </a:ext>
             </a:extLst>
           </p:cNvPr>
@@ -37486,7 +37748,7 @@
               <p:cNvPr id="5" name="Obdĺžnik 4">
                 <a:extLst>
                   <a:ext uri="{FF2B5EF4-FFF2-40B4-BE49-F238E27FC236}">
-                    <a16:creationId xmlns:a16="http://schemas.microsoft.com/office/drawing/2014/main" id="{F64D1C35-B370-4EB5-823D-534596419ADF}"/>
+                    <a16:creationId xmlns:a16="http://schemas.microsoft.com/office/drawing/2014/main" xmlns="" id="{F64D1C35-B370-4EB5-823D-534596419ADF}"/>
                   </a:ext>
                 </a:extLst>
               </p:cNvPr>
@@ -37659,7 +37921,7 @@
           <p:cNvPr id="6" name="Obrázok 5">
             <a:extLst>
               <a:ext uri="{FF2B5EF4-FFF2-40B4-BE49-F238E27FC236}">
-                <a16:creationId xmlns:a16="http://schemas.microsoft.com/office/drawing/2014/main" id="{294E46B8-F0E7-4189-A26A-73AAD96DC1E2}"/>
+                <a16:creationId xmlns:a16="http://schemas.microsoft.com/office/drawing/2014/main" xmlns="" id="{294E46B8-F0E7-4189-A26A-73AAD96DC1E2}"/>
               </a:ext>
             </a:extLst>
           </p:cNvPr>
@@ -37842,7 +38104,7 @@
           <p:cNvPr id="2" name="Nadpis 1">
             <a:extLst>
               <a:ext uri="{FF2B5EF4-FFF2-40B4-BE49-F238E27FC236}">
-                <a16:creationId xmlns:a16="http://schemas.microsoft.com/office/drawing/2014/main" id="{9D447D02-B427-4705-AEC1-07C1FDEF7D82}"/>
+                <a16:creationId xmlns:a16="http://schemas.microsoft.com/office/drawing/2014/main" xmlns="" id="{9D447D02-B427-4705-AEC1-07C1FDEF7D82}"/>
               </a:ext>
             </a:extLst>
           </p:cNvPr>
@@ -37872,7 +38134,7 @@
               <p:cNvPr id="3" name="Zástupný objekt pre obsah 2">
                 <a:extLst>
                   <a:ext uri="{FF2B5EF4-FFF2-40B4-BE49-F238E27FC236}">
-                    <a16:creationId xmlns:a16="http://schemas.microsoft.com/office/drawing/2014/main" id="{C0724A77-D3A7-4CF8-AAA7-2398DEFE52EB}"/>
+                    <a16:creationId xmlns:a16="http://schemas.microsoft.com/office/drawing/2014/main" xmlns="" id="{C0724A77-D3A7-4CF8-AAA7-2398DEFE52EB}"/>
                   </a:ext>
                 </a:extLst>
               </p:cNvPr>
@@ -38714,7 +38976,7 @@
               <p:cNvPr id="4" name="Obdĺžnik 3">
                 <a:extLst>
                   <a:ext uri="{FF2B5EF4-FFF2-40B4-BE49-F238E27FC236}">
-                    <a16:creationId xmlns:a16="http://schemas.microsoft.com/office/drawing/2014/main" id="{35E39FDB-F7D5-46F9-95A3-58382BB5D855}"/>
+                    <a16:creationId xmlns:a16="http://schemas.microsoft.com/office/drawing/2014/main" xmlns="" id="{35E39FDB-F7D5-46F9-95A3-58382BB5D855}"/>
                   </a:ext>
                 </a:extLst>
               </p:cNvPr>
@@ -39159,7 +39421,7 @@
           <p:cNvPr id="6" name="Rovná spojovacia šípka 5">
             <a:extLst>
               <a:ext uri="{FF2B5EF4-FFF2-40B4-BE49-F238E27FC236}">
-                <a16:creationId xmlns:a16="http://schemas.microsoft.com/office/drawing/2014/main" id="{41C4A15C-F036-435A-8209-BD03E59C2C28}"/>
+                <a16:creationId xmlns:a16="http://schemas.microsoft.com/office/drawing/2014/main" xmlns="" id="{41C4A15C-F036-435A-8209-BD03E59C2C28}"/>
               </a:ext>
             </a:extLst>
           </p:cNvPr>
@@ -39202,7 +39464,7 @@
               <p:cNvPr id="9" name="Obdĺžnik 8">
                 <a:extLst>
                   <a:ext uri="{FF2B5EF4-FFF2-40B4-BE49-F238E27FC236}">
-                    <a16:creationId xmlns:a16="http://schemas.microsoft.com/office/drawing/2014/main" id="{1865F617-98B0-4324-B27C-22C6F658973B}"/>
+                    <a16:creationId xmlns:a16="http://schemas.microsoft.com/office/drawing/2014/main" xmlns="" id="{1865F617-98B0-4324-B27C-22C6F658973B}"/>
                   </a:ext>
                 </a:extLst>
               </p:cNvPr>
@@ -39603,7 +39865,7 @@
           <p:cNvPr id="10" name="Object 9">
             <a:extLst>
               <a:ext uri="{FF2B5EF4-FFF2-40B4-BE49-F238E27FC236}">
-                <a16:creationId xmlns:a16="http://schemas.microsoft.com/office/drawing/2014/main" id="{373EE0D4-5CE8-4279-9899-EC4106D96D7E}"/>
+                <a16:creationId xmlns:a16="http://schemas.microsoft.com/office/drawing/2014/main" xmlns="" id="{373EE0D4-5CE8-4279-9899-EC4106D96D7E}"/>
               </a:ext>
             </a:extLst>
           </p:cNvPr>
@@ -39626,7 +39888,7 @@
           <a:graphicData uri="http://schemas.openxmlformats.org/presentationml/2006/ole">
             <mc:AlternateContent xmlns:mc="http://schemas.openxmlformats.org/markup-compatibility/2006">
               <mc:Choice xmlns:v="urn:schemas-microsoft-com:vml" Requires="v">
-                <p:oleObj spid="_x0000_s5163" name="Rovnica" r:id="rId6" imgW="2666880" imgH="1041120" progId="Equation.3">
+                <p:oleObj spid="_x0000_s5169" name="Rovnica" r:id="rId6" imgW="2666880" imgH="1041120" progId="Equation.3">
                   <p:embed/>
                 </p:oleObj>
               </mc:Choice>
@@ -39689,7 +39951,7 @@
           <p:cNvPr id="11" name="Rovná spojovacia šípka 10">
             <a:extLst>
               <a:ext uri="{FF2B5EF4-FFF2-40B4-BE49-F238E27FC236}">
-                <a16:creationId xmlns:a16="http://schemas.microsoft.com/office/drawing/2014/main" id="{8CC9BC81-FD41-4CEE-929E-4057B4ADF82F}"/>
+                <a16:creationId xmlns:a16="http://schemas.microsoft.com/office/drawing/2014/main" xmlns="" id="{8CC9BC81-FD41-4CEE-929E-4057B4ADF82F}"/>
               </a:ext>
             </a:extLst>
           </p:cNvPr>
@@ -39975,7 +40237,7 @@
           <p:cNvPr id="2" name="Nadpis 1">
             <a:extLst>
               <a:ext uri="{FF2B5EF4-FFF2-40B4-BE49-F238E27FC236}">
-                <a16:creationId xmlns:a16="http://schemas.microsoft.com/office/drawing/2014/main" id="{6484DB64-DFEB-480E-A297-C01F2FFCDE8C}"/>
+                <a16:creationId xmlns:a16="http://schemas.microsoft.com/office/drawing/2014/main" xmlns="" id="{6484DB64-DFEB-480E-A297-C01F2FFCDE8C}"/>
               </a:ext>
             </a:extLst>
           </p:cNvPr>
@@ -40005,7 +40267,7 @@
               <p:cNvPr id="3" name="Zástupný objekt pre obsah 2">
                 <a:extLst>
                   <a:ext uri="{FF2B5EF4-FFF2-40B4-BE49-F238E27FC236}">
-                    <a16:creationId xmlns:a16="http://schemas.microsoft.com/office/drawing/2014/main" id="{3DA36AFD-AABF-48BB-A71D-8B3456D81D5D}"/>
+                    <a16:creationId xmlns:a16="http://schemas.microsoft.com/office/drawing/2014/main" xmlns="" id="{3DA36AFD-AABF-48BB-A71D-8B3456D81D5D}"/>
                   </a:ext>
                 </a:extLst>
               </p:cNvPr>

</xml_diff>